<commit_message>
Editing the ppt file
</commit_message>
<xml_diff>
--- a/Asset Portfolio Generator.pptx
+++ b/Asset Portfolio Generator.pptx
@@ -113,6 +113,11 @@
       </a:defRPr>
     </a:lvl9pPr>
   </p:defaultTextStyle>
+  <p:extLst>
+    <p:ext uri="{EFAFB233-063F-42B5-8137-9DF3F51BA10A}">
+      <p15:sldGuideLst xmlns:p15="http://schemas.microsoft.com/office/powerpoint/2012/main"/>
+    </p:ext>
+  </p:extLst>
 </p:presentation>
 </file>
 
@@ -920,7 +925,7 @@
         <a:lstStyle/>
         <a:p>
           <a:r>
-            <a:rPr lang="en-US"/>
+            <a:rPr lang="en-US" dirty="0"/>
             <a:t>Improving</a:t>
           </a:r>
         </a:p>
@@ -992,7 +997,7 @@
         <a:lstStyle/>
         <a:p>
           <a:r>
-            <a:rPr lang="en-US"/>
+            <a:rPr lang="en-US" dirty="0"/>
             <a:t>Creating</a:t>
           </a:r>
         </a:p>
@@ -1100,7 +1105,7 @@
         <a:lstStyle/>
         <a:p>
           <a:r>
-            <a:rPr lang="en-US"/>
+            <a:rPr lang="en-US" dirty="0"/>
             <a:t>Adding links and directions on how to purchase shares; </a:t>
           </a:r>
         </a:p>
@@ -1240,7 +1245,7 @@
       <dgm:spPr/>
     </dgm:pt>
     <dgm:pt modelId="{AFD7C25D-E26C-4F47-8C64-C285DF0A56B1}" type="pres">
-      <dgm:prSet presAssocID="{4450D39C-5E7B-4856-ADFA-0BEE9866D7F4}" presName="parentText" presStyleLbl="alignNode1" presStyleIdx="1" presStyleCnt="4" custScaleX="137175">
+      <dgm:prSet presAssocID="{4450D39C-5E7B-4856-ADFA-0BEE9866D7F4}" presName="parentText" presStyleLbl="alignNode1" presStyleIdx="1" presStyleCnt="4" custScaleX="132562">
         <dgm:presLayoutVars>
           <dgm:chMax val="1"/>
           <dgm:bulletEnabled/>
@@ -1265,7 +1270,7 @@
       <dgm:spPr/>
     </dgm:pt>
     <dgm:pt modelId="{7A79F2EC-E30E-4985-8B3A-ED91717B067F}" type="pres">
-      <dgm:prSet presAssocID="{B6D5E7EB-7347-4DA6-BEE0-1C974513C787}" presName="parentText" presStyleLbl="alignNode1" presStyleIdx="2" presStyleCnt="4" custScaleX="132103">
+      <dgm:prSet presAssocID="{B6D5E7EB-7347-4DA6-BEE0-1C974513C787}" presName="parentText" presStyleLbl="alignNode1" presStyleIdx="2" presStyleCnt="4" custScaleX="140817">
         <dgm:presLayoutVars>
           <dgm:chMax val="1"/>
           <dgm:bulletEnabled/>
@@ -1366,7 +1371,7 @@
       </dsp:nvSpPr>
       <dsp:spPr>
         <a:xfrm>
-          <a:off x="1164695" y="1871"/>
+          <a:off x="1164900" y="1871"/>
           <a:ext cx="3525627" cy="969594"/>
         </a:xfrm>
         <a:prstGeom prst="rect">
@@ -1434,7 +1439,7 @@
         </a:p>
       </dsp:txBody>
       <dsp:txXfrm>
-        <a:off x="1164695" y="1871"/>
+        <a:off x="1164900" y="1871"/>
         <a:ext cx="3525627" cy="969594"/>
       </dsp:txXfrm>
     </dsp:sp>
@@ -1445,7 +1450,7 @@
       </dsp:nvSpPr>
       <dsp:spPr>
         <a:xfrm>
-          <a:off x="330" y="1871"/>
+          <a:off x="535" y="1871"/>
           <a:ext cx="1164364" cy="969594"/>
         </a:xfrm>
         <a:prstGeom prst="rect">
@@ -1505,13 +1510,13 @@
             <a:buNone/>
           </a:pPr>
           <a:r>
-            <a:rPr lang="en-US" sz="1400" kern="1200"/>
+            <a:rPr lang="en-US" sz="1400" kern="1200" dirty="0"/>
             <a:t>Improving</a:t>
           </a:r>
         </a:p>
       </dsp:txBody>
       <dsp:txXfrm>
-        <a:off x="330" y="1871"/>
+        <a:off x="535" y="1871"/>
         <a:ext cx="1164364" cy="969594"/>
       </dsp:txXfrm>
     </dsp:sp>
@@ -1522,8 +1527,8 @@
       </dsp:nvSpPr>
       <dsp:spPr>
         <a:xfrm>
-          <a:off x="1198089" y="1029642"/>
-          <a:ext cx="3492642" cy="969594"/>
+          <a:off x="1167731" y="1029642"/>
+          <a:ext cx="3521962" cy="969594"/>
         </a:xfrm>
         <a:prstGeom prst="rect">
           <a:avLst/>
@@ -1566,7 +1571,7 @@
         <a:fontRef idx="minor"/>
       </dsp:style>
       <dsp:txBody>
-        <a:bodyPr spcFirstLastPara="0" vert="horz" wrap="square" lIns="67767" tIns="246277" rIns="67767" bIns="246277" numCol="1" spcCol="1270" anchor="ctr" anchorCtr="0">
+        <a:bodyPr spcFirstLastPara="0" vert="horz" wrap="square" lIns="68336" tIns="246277" rIns="68336" bIns="246277" numCol="1" spcCol="1270" anchor="ctr" anchorCtr="0">
           <a:noAutofit/>
         </a:bodyPr>
         <a:lstStyle/>
@@ -1590,8 +1595,8 @@
         </a:p>
       </dsp:txBody>
       <dsp:txXfrm>
-        <a:off x="1198089" y="1029642"/>
-        <a:ext cx="3492642" cy="969594"/>
+        <a:off x="1167731" y="1029642"/>
+        <a:ext cx="3521962" cy="969594"/>
       </dsp:txXfrm>
     </dsp:sp>
     <dsp:sp modelId="{AFD7C25D-E26C-4F47-8C64-C285DF0A56B1}">
@@ -1601,8 +1606,8 @@
       </dsp:nvSpPr>
       <dsp:spPr>
         <a:xfrm>
-          <a:off x="330" y="1029642"/>
-          <a:ext cx="1197758" cy="969594"/>
+          <a:off x="535" y="1029642"/>
+          <a:ext cx="1167195" cy="969594"/>
         </a:xfrm>
         <a:prstGeom prst="rect">
           <a:avLst/>
@@ -1643,7 +1648,7 @@
         </a:fontRef>
       </dsp:style>
       <dsp:txBody>
-        <a:bodyPr spcFirstLastPara="0" vert="horz" wrap="square" lIns="46205" tIns="95774" rIns="46205" bIns="95774" numCol="1" spcCol="1270" anchor="ctr" anchorCtr="0">
+        <a:bodyPr spcFirstLastPara="0" vert="horz" wrap="square" lIns="46593" tIns="95774" rIns="46593" bIns="95774" numCol="1" spcCol="1270" anchor="ctr" anchorCtr="0">
           <a:noAutofit/>
         </a:bodyPr>
         <a:lstStyle/>
@@ -1661,14 +1666,14 @@
             <a:buNone/>
           </a:pPr>
           <a:r>
-            <a:rPr lang="en-US" sz="1400" kern="1200"/>
+            <a:rPr lang="en-US" sz="1400" kern="1200" dirty="0"/>
             <a:t>Creating</a:t>
           </a:r>
         </a:p>
       </dsp:txBody>
       <dsp:txXfrm>
-        <a:off x="330" y="1029642"/>
-        <a:ext cx="1197758" cy="969594"/>
+        <a:off x="535" y="1029642"/>
+        <a:ext cx="1167195" cy="969594"/>
       </dsp:txXfrm>
     </dsp:sp>
     <dsp:sp modelId="{06A60CF0-B144-4460-80F0-07650C1C23F9}">
@@ -1678,8 +1683,8 @@
       </dsp:nvSpPr>
       <dsp:spPr>
         <a:xfrm>
-          <a:off x="1164695" y="2057412"/>
-          <a:ext cx="3525627" cy="969594"/>
+          <a:off x="1221062" y="2057412"/>
+          <a:ext cx="3466988" cy="969594"/>
         </a:xfrm>
         <a:prstGeom prst="rect">
           <a:avLst/>
@@ -1722,7 +1727,7 @@
         <a:fontRef idx="minor"/>
       </dsp:style>
       <dsp:txBody>
-        <a:bodyPr spcFirstLastPara="0" vert="horz" wrap="square" lIns="68407" tIns="246277" rIns="68407" bIns="246277" numCol="1" spcCol="1270" anchor="ctr" anchorCtr="0">
+        <a:bodyPr spcFirstLastPara="0" vert="horz" wrap="square" lIns="67269" tIns="246277" rIns="67269" bIns="246277" numCol="1" spcCol="1270" anchor="ctr" anchorCtr="0">
           <a:noAutofit/>
         </a:bodyPr>
         <a:lstStyle/>
@@ -1740,14 +1745,14 @@
             <a:buNone/>
           </a:pPr>
           <a:r>
-            <a:rPr lang="en-US" sz="1100" kern="1200"/>
+            <a:rPr lang="en-US" sz="1100" kern="1200" dirty="0"/>
             <a:t>Adding links and directions on how to purchase shares; </a:t>
           </a:r>
         </a:p>
       </dsp:txBody>
       <dsp:txXfrm>
-        <a:off x="1164695" y="2057412"/>
-        <a:ext cx="3525627" cy="969594"/>
+        <a:off x="1221062" y="2057412"/>
+        <a:ext cx="3466988" cy="969594"/>
       </dsp:txXfrm>
     </dsp:sp>
     <dsp:sp modelId="{7A79F2EC-E30E-4985-8B3A-ED91717B067F}">
@@ -1757,8 +1762,8 @@
       </dsp:nvSpPr>
       <dsp:spPr>
         <a:xfrm>
-          <a:off x="330" y="2057412"/>
-          <a:ext cx="1164364" cy="969594"/>
+          <a:off x="535" y="2057412"/>
+          <a:ext cx="1220527" cy="969594"/>
         </a:xfrm>
         <a:prstGeom prst="rect">
           <a:avLst/>
@@ -1799,7 +1804,7 @@
         </a:fontRef>
       </dsp:style>
       <dsp:txBody>
-        <a:bodyPr spcFirstLastPara="0" vert="horz" wrap="square" lIns="46641" tIns="95774" rIns="46641" bIns="95774" numCol="1" spcCol="1270" anchor="ctr" anchorCtr="0">
+        <a:bodyPr spcFirstLastPara="0" vert="horz" wrap="square" lIns="45865" tIns="95774" rIns="45865" bIns="95774" numCol="1" spcCol="1270" anchor="ctr" anchorCtr="0">
           <a:noAutofit/>
         </a:bodyPr>
         <a:lstStyle/>
@@ -1823,8 +1828,8 @@
         </a:p>
       </dsp:txBody>
       <dsp:txXfrm>
-        <a:off x="330" y="2057412"/>
-        <a:ext cx="1164364" cy="969594"/>
+        <a:off x="535" y="2057412"/>
+        <a:ext cx="1220527" cy="969594"/>
       </dsp:txXfrm>
     </dsp:sp>
     <dsp:sp modelId="{D8C85123-8647-470F-BCA1-A8FCE6E633E6}">
@@ -1834,7 +1839,7 @@
       </dsp:nvSpPr>
       <dsp:spPr>
         <a:xfrm>
-          <a:off x="1215030" y="3085182"/>
+          <a:off x="1215235" y="3085182"/>
           <a:ext cx="3474318" cy="969594"/>
         </a:xfrm>
         <a:prstGeom prst="rect">
@@ -1902,7 +1907,7 @@
         </a:p>
       </dsp:txBody>
       <dsp:txXfrm>
-        <a:off x="1215030" y="3085182"/>
+        <a:off x="1215235" y="3085182"/>
         <a:ext cx="3474318" cy="969594"/>
       </dsp:txXfrm>
     </dsp:sp>
@@ -4002,6 +4007,21 @@
             </a:pPr>
             <a:r>
               <a:rPr lang="en-AU" dirty="0"/>
+              <a:t>Pete</a:t>
+            </a:r>
+          </a:p>
+          <a:p>
+            <a:pPr marL="0" lvl="0" indent="0" algn="l" rtl="0">
+              <a:spcBef>
+                <a:spcPts val="0"/>
+              </a:spcBef>
+              <a:spcAft>
+                <a:spcPts val="0"/>
+              </a:spcAft>
+              <a:buNone/>
+            </a:pPr>
+            <a:r>
+              <a:rPr lang="en-AU" dirty="0"/>
               <a:t>Motivation –the motivation of this app is drastically falling share prices due to COVID-19. In these times, we believe it is still important that individuals don’t get caught up in the confusion and hype. We must continue to make educated investment decision that remain appropriate for our needs and risk tolerance.  The app is designed to ensure that we continue to target stocks that align with our risk tolerance using a beta measurement. </a:t>
             </a:r>
             <a:endParaRPr dirty="0"/>
@@ -4098,6 +4118,21 @@
             <a:noAutofit/>
           </a:bodyPr>
           <a:lstStyle/>
+          <a:p>
+            <a:pPr marL="0" lvl="0" indent="0" algn="l" rtl="0">
+              <a:spcBef>
+                <a:spcPts val="0"/>
+              </a:spcBef>
+              <a:spcAft>
+                <a:spcPts val="0"/>
+              </a:spcAft>
+              <a:buNone/>
+            </a:pPr>
+            <a:r>
+              <a:rPr lang="en-AU" dirty="0"/>
+              <a:t>Pete </a:t>
+            </a:r>
+          </a:p>
           <a:p>
             <a:pPr marL="0" lvl="0" indent="0" algn="l" rtl="0">
               <a:spcBef>
@@ -4484,7 +4519,15 @@
               </a:spcAft>
               <a:buNone/>
             </a:pPr>
-            <a:endParaRPr/>
+            <a:r>
+              <a:rPr lang="en-AU" dirty="0" err="1"/>
+              <a:t>Mwansa</a:t>
+            </a:r>
+            <a:r>
+              <a:rPr lang="en-AU" dirty="0"/>
+              <a:t> </a:t>
+            </a:r>
+            <a:endParaRPr dirty="0"/>
           </a:p>
         </p:txBody>
       </p:sp>
@@ -4588,7 +4631,11 @@
               </a:spcAft>
               <a:buNone/>
             </a:pPr>
-            <a:endParaRPr/>
+            <a:r>
+              <a:rPr lang="en-AU" dirty="0"/>
+              <a:t>Michelle </a:t>
+            </a:r>
+            <a:endParaRPr dirty="0"/>
           </a:p>
         </p:txBody>
       </p:sp>
@@ -4692,7 +4739,7 @@
               </a:spcAft>
               <a:buNone/>
             </a:pPr>
-            <a:endParaRPr/>
+            <a:endParaRPr dirty="0"/>
           </a:p>
         </p:txBody>
       </p:sp>
@@ -5915,7 +5962,7 @@
           <a:p>
             <a:fld id="{4BDF68E2-58F2-4D09-BE8B-E3BD06533059}" type="datetimeFigureOut">
               <a:rPr lang="en-US" smtClean="0"/>
-              <a:t>3/28/2020</a:t>
+              <a:t>3/30/2020</a:t>
             </a:fld>
             <a:endParaRPr lang="en-US" dirty="0"/>
           </a:p>
@@ -6163,7 +6210,7 @@
           <a:p>
             <a:fld id="{2E2D6473-DF6D-4702-B328-E0DD40540A4E}" type="datetimeFigureOut">
               <a:rPr lang="en-US" smtClean="0"/>
-              <a:t>3/28/2020</a:t>
+              <a:t>3/30/2020</a:t>
             </a:fld>
             <a:endParaRPr lang="en-US" dirty="0"/>
           </a:p>
@@ -6353,7 +6400,7 @@
           <a:p>
             <a:fld id="{E26F7E3A-B166-407D-9866-32884E7D5B37}" type="datetimeFigureOut">
               <a:rPr lang="en-US" smtClean="0"/>
-              <a:t>3/28/2020</a:t>
+              <a:t>3/30/2020</a:t>
             </a:fld>
             <a:endParaRPr lang="en-US" dirty="0"/>
           </a:p>
@@ -7138,7 +7185,7 @@
           <a:p>
             <a:fld id="{528FC5F6-F338-4AE4-BB23-26385BCFC423}" type="datetimeFigureOut">
               <a:rPr lang="en-US" smtClean="0"/>
-              <a:t>3/28/2020</a:t>
+              <a:t>3/30/2020</a:t>
             </a:fld>
             <a:endParaRPr lang="en-US" dirty="0"/>
           </a:p>
@@ -7424,7 +7471,7 @@
           <a:p>
             <a:fld id="{20EBB0C4-6273-4C6E-B9BD-2EDC30F1CD52}" type="datetimeFigureOut">
               <a:rPr lang="en-US" smtClean="0"/>
-              <a:t>3/28/2020</a:t>
+              <a:t>3/30/2020</a:t>
             </a:fld>
             <a:endParaRPr lang="en-US" dirty="0"/>
           </a:p>
@@ -8635,7 +8682,7 @@
           <a:p>
             <a:fld id="{19AB4D41-86C1-4908-B66A-0B50CEB3BF29}" type="datetimeFigureOut">
               <a:rPr lang="en-US" smtClean="0"/>
-              <a:t>3/28/2020</a:t>
+              <a:t>3/30/2020</a:t>
             </a:fld>
             <a:endParaRPr lang="en-US" dirty="0"/>
           </a:p>
@@ -9035,7 +9082,7 @@
           <a:p>
             <a:fld id="{E6426E2C-56C1-4E0D-A793-0088A7FDD37E}" type="datetimeFigureOut">
               <a:rPr lang="en-US" smtClean="0"/>
-              <a:t>3/28/2020</a:t>
+              <a:t>3/30/2020</a:t>
             </a:fld>
             <a:endParaRPr lang="en-US" dirty="0"/>
           </a:p>
@@ -9168,7 +9215,7 @@
           <a:p>
             <a:fld id="{C8C39B41-D8B5-4052-B551-9B5525EAA8B6}" type="datetimeFigureOut">
               <a:rPr lang="en-US" smtClean="0"/>
-              <a:t>3/28/2020</a:t>
+              <a:t>3/30/2020</a:t>
             </a:fld>
             <a:endParaRPr lang="en-US" dirty="0"/>
           </a:p>
@@ -9273,7 +9320,7 @@
           <a:p>
             <a:fld id="{4D94136C-8742-45B2-AF27-D93DF72833A9}" type="datetimeFigureOut">
               <a:rPr lang="en-US" smtClean="0"/>
-              <a:t>3/28/2020</a:t>
+              <a:t>3/30/2020</a:t>
             </a:fld>
             <a:endParaRPr lang="en-US" dirty="0"/>
           </a:p>
@@ -10045,7 +10092,7 @@
           <a:p>
             <a:fld id="{32ABBEA6-7C60-4B02-AE87-00D78D8422AF}" type="datetimeFigureOut">
               <a:rPr lang="en-US" smtClean="0"/>
-              <a:t>3/28/2020</a:t>
+              <a:t>3/30/2020</a:t>
             </a:fld>
             <a:endParaRPr lang="en-US" dirty="0"/>
           </a:p>
@@ -10895,7 +10942,7 @@
           <a:p>
             <a:fld id="{C9CAD897-D46E-4AD2-BD9B-49DD3E640873}" type="datetimeFigureOut">
               <a:rPr lang="en-US" smtClean="0"/>
-              <a:t>3/28/2020</a:t>
+              <a:t>3/30/2020</a:t>
             </a:fld>
             <a:endParaRPr lang="en-US" dirty="0"/>
           </a:p>
@@ -11132,7 +11179,7 @@
           <a:p>
             <a:fld id="{98624D31-43A5-475A-80CF-332C9F6DCF35}" type="datetimeFigureOut">
               <a:rPr lang="en-US" smtClean="0"/>
-              <a:t>3/28/2020</a:t>
+              <a:t>3/30/2020</a:t>
             </a:fld>
             <a:endParaRPr lang="en-US" dirty="0"/>
           </a:p>
@@ -12246,8 +12293,8 @@
               <a:buNone/>
             </a:pPr>
             <a:r>
-              <a:rPr lang="en-AU" sz="5000"/>
-              <a:t>Asset Portfolio Generator</a:t>
+              <a:rPr lang="en-AU" sz="5000" dirty="0"/>
+              <a:t>stock Portfolio Generator</a:t>
             </a:r>
           </a:p>
         </p:txBody>
@@ -13541,6 +13588,14 @@
 <file path=ppt/slides/slide2.xml><?xml version="1.0" encoding="utf-8"?>
 <p:sld xmlns:a="http://schemas.openxmlformats.org/drawingml/2006/main" xmlns:r="http://schemas.openxmlformats.org/officeDocument/2006/relationships" xmlns:p="http://schemas.openxmlformats.org/presentationml/2006/main">
   <p:cSld>
+    <p:bg>
+      <p:bgPr>
+        <a:solidFill>
+          <a:schemeClr val="bg1"/>
+        </a:solidFill>
+        <a:effectLst/>
+      </p:bgPr>
+    </p:bg>
     <p:spTree>
       <p:nvGrpSpPr>
         <p:cNvPr id="1" name="Shape 59"/>
@@ -13557,6 +13612,1283 @@
       </p:grpSpPr>
       <p:sp>
         <p:nvSpPr>
+          <p:cNvPr id="98" name="Freeform 6">
+            <a:extLst>
+              <a:ext uri="{FF2B5EF4-FFF2-40B4-BE49-F238E27FC236}">
+                <a16:creationId xmlns:a16="http://schemas.microsoft.com/office/drawing/2014/main" id="{B217C2AD-51B4-40CE-A71F-F5D3F846D97B}"/>
+              </a:ext>
+              <a:ext uri="{C183D7F6-B498-43B3-948B-1728B52AA6E4}">
+                <adec:decorative xmlns:adec="http://schemas.microsoft.com/office/drawing/2017/decorative" val="1"/>
+              </a:ext>
+            </a:extLst>
+          </p:cNvPr>
+          <p:cNvSpPr>
+            <a:spLocks noGrp="1" noRot="1" noChangeAspect="1" noMove="1" noResize="1" noEditPoints="1" noAdjustHandles="1" noChangeArrowheads="1" noChangeShapeType="1" noTextEdit="1"/>
+          </p:cNvSpPr>
+          <p:nvPr>
+            <p:extLst>
+              <p:ext uri="{386F3935-93C4-4BCD-93E2-E3B085C9AB24}">
+                <p16:designElem xmlns:p16="http://schemas.microsoft.com/office/powerpoint/2015/main" val="1"/>
+              </p:ext>
+            </p:extLst>
+          </p:nvPr>
+        </p:nvSpPr>
+        <p:spPr bwMode="auto">
+          <a:xfrm>
+            <a:off x="2667762" y="473202"/>
+            <a:ext cx="3926681" cy="3921918"/>
+          </a:xfrm>
+          <a:custGeom>
+            <a:avLst/>
+            <a:gdLst/>
+            <a:ahLst/>
+            <a:cxnLst/>
+            <a:rect l="0" t="0" r="r" b="b"/>
+            <a:pathLst>
+              <a:path w="3298" h="3294">
+                <a:moveTo>
+                  <a:pt x="1649" y="0"/>
+                </a:moveTo>
+                <a:lnTo>
+                  <a:pt x="1681" y="3"/>
+                </a:lnTo>
+                <a:lnTo>
+                  <a:pt x="1712" y="11"/>
+                </a:lnTo>
+                <a:lnTo>
+                  <a:pt x="1742" y="23"/>
+                </a:lnTo>
+                <a:lnTo>
+                  <a:pt x="1773" y="38"/>
+                </a:lnTo>
+                <a:lnTo>
+                  <a:pt x="1802" y="55"/>
+                </a:lnTo>
+                <a:lnTo>
+                  <a:pt x="1832" y="73"/>
+                </a:lnTo>
+                <a:lnTo>
+                  <a:pt x="1862" y="89"/>
+                </a:lnTo>
+                <a:lnTo>
+                  <a:pt x="1892" y="105"/>
+                </a:lnTo>
+                <a:lnTo>
+                  <a:pt x="1921" y="117"/>
+                </a:lnTo>
+                <a:lnTo>
+                  <a:pt x="1953" y="125"/>
+                </a:lnTo>
+                <a:lnTo>
+                  <a:pt x="1984" y="129"/>
+                </a:lnTo>
+                <a:lnTo>
+                  <a:pt x="2017" y="129"/>
+                </a:lnTo>
+                <a:lnTo>
+                  <a:pt x="2051" y="127"/>
+                </a:lnTo>
+                <a:lnTo>
+                  <a:pt x="2085" y="123"/>
+                </a:lnTo>
+                <a:lnTo>
+                  <a:pt x="2119" y="118"/>
+                </a:lnTo>
+                <a:lnTo>
+                  <a:pt x="2153" y="114"/>
+                </a:lnTo>
+                <a:lnTo>
+                  <a:pt x="2187" y="111"/>
+                </a:lnTo>
+                <a:lnTo>
+                  <a:pt x="2219" y="112"/>
+                </a:lnTo>
+                <a:lnTo>
+                  <a:pt x="2250" y="116"/>
+                </a:lnTo>
+                <a:lnTo>
+                  <a:pt x="2280" y="125"/>
+                </a:lnTo>
+                <a:lnTo>
+                  <a:pt x="2305" y="138"/>
+                </a:lnTo>
+                <a:lnTo>
+                  <a:pt x="2329" y="155"/>
+                </a:lnTo>
+                <a:lnTo>
+                  <a:pt x="2350" y="175"/>
+                </a:lnTo>
+                <a:lnTo>
+                  <a:pt x="2371" y="198"/>
+                </a:lnTo>
+                <a:lnTo>
+                  <a:pt x="2390" y="222"/>
+                </a:lnTo>
+                <a:lnTo>
+                  <a:pt x="2409" y="247"/>
+                </a:lnTo>
+                <a:lnTo>
+                  <a:pt x="2428" y="272"/>
+                </a:lnTo>
+                <a:lnTo>
+                  <a:pt x="2447" y="296"/>
+                </a:lnTo>
+                <a:lnTo>
+                  <a:pt x="2467" y="319"/>
+                </a:lnTo>
+                <a:lnTo>
+                  <a:pt x="2490" y="339"/>
+                </a:lnTo>
+                <a:lnTo>
+                  <a:pt x="2512" y="357"/>
+                </a:lnTo>
+                <a:lnTo>
+                  <a:pt x="2537" y="371"/>
+                </a:lnTo>
+                <a:lnTo>
+                  <a:pt x="2564" y="383"/>
+                </a:lnTo>
+                <a:lnTo>
+                  <a:pt x="2593" y="393"/>
+                </a:lnTo>
+                <a:lnTo>
+                  <a:pt x="2623" y="402"/>
+                </a:lnTo>
+                <a:lnTo>
+                  <a:pt x="2653" y="410"/>
+                </a:lnTo>
+                <a:lnTo>
+                  <a:pt x="2684" y="418"/>
+                </a:lnTo>
+                <a:lnTo>
+                  <a:pt x="2713" y="427"/>
+                </a:lnTo>
+                <a:lnTo>
+                  <a:pt x="2742" y="437"/>
+                </a:lnTo>
+                <a:lnTo>
+                  <a:pt x="2769" y="449"/>
+                </a:lnTo>
+                <a:lnTo>
+                  <a:pt x="2793" y="464"/>
+                </a:lnTo>
+                <a:lnTo>
+                  <a:pt x="2815" y="482"/>
+                </a:lnTo>
+                <a:lnTo>
+                  <a:pt x="2833" y="504"/>
+                </a:lnTo>
+                <a:lnTo>
+                  <a:pt x="2848" y="528"/>
+                </a:lnTo>
+                <a:lnTo>
+                  <a:pt x="2860" y="555"/>
+                </a:lnTo>
+                <a:lnTo>
+                  <a:pt x="2870" y="584"/>
+                </a:lnTo>
+                <a:lnTo>
+                  <a:pt x="2879" y="613"/>
+                </a:lnTo>
+                <a:lnTo>
+                  <a:pt x="2887" y="644"/>
+                </a:lnTo>
+                <a:lnTo>
+                  <a:pt x="2895" y="674"/>
+                </a:lnTo>
+                <a:lnTo>
+                  <a:pt x="2904" y="704"/>
+                </a:lnTo>
+                <a:lnTo>
+                  <a:pt x="2914" y="733"/>
+                </a:lnTo>
+                <a:lnTo>
+                  <a:pt x="2926" y="760"/>
+                </a:lnTo>
+                <a:lnTo>
+                  <a:pt x="2940" y="785"/>
+                </a:lnTo>
+                <a:lnTo>
+                  <a:pt x="2958" y="807"/>
+                </a:lnTo>
+                <a:lnTo>
+                  <a:pt x="2978" y="830"/>
+                </a:lnTo>
+                <a:lnTo>
+                  <a:pt x="3001" y="850"/>
+                </a:lnTo>
+                <a:lnTo>
+                  <a:pt x="3025" y="869"/>
+                </a:lnTo>
+                <a:lnTo>
+                  <a:pt x="3051" y="888"/>
+                </a:lnTo>
+                <a:lnTo>
+                  <a:pt x="3076" y="907"/>
+                </a:lnTo>
+                <a:lnTo>
+                  <a:pt x="3100" y="926"/>
+                </a:lnTo>
+                <a:lnTo>
+                  <a:pt x="3123" y="947"/>
+                </a:lnTo>
+                <a:lnTo>
+                  <a:pt x="3143" y="968"/>
+                </a:lnTo>
+                <a:lnTo>
+                  <a:pt x="3160" y="992"/>
+                </a:lnTo>
+                <a:lnTo>
+                  <a:pt x="3173" y="1017"/>
+                </a:lnTo>
+                <a:lnTo>
+                  <a:pt x="3182" y="1047"/>
+                </a:lnTo>
+                <a:lnTo>
+                  <a:pt x="3186" y="1078"/>
+                </a:lnTo>
+                <a:lnTo>
+                  <a:pt x="3187" y="1110"/>
+                </a:lnTo>
+                <a:lnTo>
+                  <a:pt x="3184" y="1144"/>
+                </a:lnTo>
+                <a:lnTo>
+                  <a:pt x="3180" y="1178"/>
+                </a:lnTo>
+                <a:lnTo>
+                  <a:pt x="3175" y="1212"/>
+                </a:lnTo>
+                <a:lnTo>
+                  <a:pt x="3171" y="1246"/>
+                </a:lnTo>
+                <a:lnTo>
+                  <a:pt x="3169" y="1280"/>
+                </a:lnTo>
+                <a:lnTo>
+                  <a:pt x="3169" y="1313"/>
+                </a:lnTo>
+                <a:lnTo>
+                  <a:pt x="3173" y="1344"/>
+                </a:lnTo>
+                <a:lnTo>
+                  <a:pt x="3181" y="1375"/>
+                </a:lnTo>
+                <a:lnTo>
+                  <a:pt x="3193" y="1404"/>
+                </a:lnTo>
+                <a:lnTo>
+                  <a:pt x="3209" y="1434"/>
+                </a:lnTo>
+                <a:lnTo>
+                  <a:pt x="3225" y="1464"/>
+                </a:lnTo>
+                <a:lnTo>
+                  <a:pt x="3243" y="1494"/>
+                </a:lnTo>
+                <a:lnTo>
+                  <a:pt x="3260" y="1523"/>
+                </a:lnTo>
+                <a:lnTo>
+                  <a:pt x="3275" y="1554"/>
+                </a:lnTo>
+                <a:lnTo>
+                  <a:pt x="3287" y="1584"/>
+                </a:lnTo>
+                <a:lnTo>
+                  <a:pt x="3295" y="1615"/>
+                </a:lnTo>
+                <a:lnTo>
+                  <a:pt x="3298" y="1647"/>
+                </a:lnTo>
+                <a:lnTo>
+                  <a:pt x="3295" y="1679"/>
+                </a:lnTo>
+                <a:lnTo>
+                  <a:pt x="3287" y="1710"/>
+                </a:lnTo>
+                <a:lnTo>
+                  <a:pt x="3275" y="1740"/>
+                </a:lnTo>
+                <a:lnTo>
+                  <a:pt x="3260" y="1771"/>
+                </a:lnTo>
+                <a:lnTo>
+                  <a:pt x="3243" y="1800"/>
+                </a:lnTo>
+                <a:lnTo>
+                  <a:pt x="3225" y="1830"/>
+                </a:lnTo>
+                <a:lnTo>
+                  <a:pt x="3209" y="1860"/>
+                </a:lnTo>
+                <a:lnTo>
+                  <a:pt x="3193" y="1890"/>
+                </a:lnTo>
+                <a:lnTo>
+                  <a:pt x="3181" y="1919"/>
+                </a:lnTo>
+                <a:lnTo>
+                  <a:pt x="3173" y="1950"/>
+                </a:lnTo>
+                <a:lnTo>
+                  <a:pt x="3169" y="1981"/>
+                </a:lnTo>
+                <a:lnTo>
+                  <a:pt x="3169" y="2014"/>
+                </a:lnTo>
+                <a:lnTo>
+                  <a:pt x="3171" y="2048"/>
+                </a:lnTo>
+                <a:lnTo>
+                  <a:pt x="3175" y="2082"/>
+                </a:lnTo>
+                <a:lnTo>
+                  <a:pt x="3180" y="2116"/>
+                </a:lnTo>
+                <a:lnTo>
+                  <a:pt x="3184" y="2150"/>
+                </a:lnTo>
+                <a:lnTo>
+                  <a:pt x="3187" y="2184"/>
+                </a:lnTo>
+                <a:lnTo>
+                  <a:pt x="3186" y="2216"/>
+                </a:lnTo>
+                <a:lnTo>
+                  <a:pt x="3182" y="2247"/>
+                </a:lnTo>
+                <a:lnTo>
+                  <a:pt x="3173" y="2277"/>
+                </a:lnTo>
+                <a:lnTo>
+                  <a:pt x="3160" y="2302"/>
+                </a:lnTo>
+                <a:lnTo>
+                  <a:pt x="3143" y="2326"/>
+                </a:lnTo>
+                <a:lnTo>
+                  <a:pt x="3123" y="2347"/>
+                </a:lnTo>
+                <a:lnTo>
+                  <a:pt x="3100" y="2368"/>
+                </a:lnTo>
+                <a:lnTo>
+                  <a:pt x="3076" y="2387"/>
+                </a:lnTo>
+                <a:lnTo>
+                  <a:pt x="3051" y="2406"/>
+                </a:lnTo>
+                <a:lnTo>
+                  <a:pt x="3025" y="2425"/>
+                </a:lnTo>
+                <a:lnTo>
+                  <a:pt x="3001" y="2444"/>
+                </a:lnTo>
+                <a:lnTo>
+                  <a:pt x="2978" y="2464"/>
+                </a:lnTo>
+                <a:lnTo>
+                  <a:pt x="2958" y="2487"/>
+                </a:lnTo>
+                <a:lnTo>
+                  <a:pt x="2940" y="2509"/>
+                </a:lnTo>
+                <a:lnTo>
+                  <a:pt x="2926" y="2534"/>
+                </a:lnTo>
+                <a:lnTo>
+                  <a:pt x="2914" y="2561"/>
+                </a:lnTo>
+                <a:lnTo>
+                  <a:pt x="2904" y="2590"/>
+                </a:lnTo>
+                <a:lnTo>
+                  <a:pt x="2895" y="2620"/>
+                </a:lnTo>
+                <a:lnTo>
+                  <a:pt x="2887" y="2650"/>
+                </a:lnTo>
+                <a:lnTo>
+                  <a:pt x="2879" y="2681"/>
+                </a:lnTo>
+                <a:lnTo>
+                  <a:pt x="2870" y="2710"/>
+                </a:lnTo>
+                <a:lnTo>
+                  <a:pt x="2860" y="2739"/>
+                </a:lnTo>
+                <a:lnTo>
+                  <a:pt x="2848" y="2766"/>
+                </a:lnTo>
+                <a:lnTo>
+                  <a:pt x="2833" y="2790"/>
+                </a:lnTo>
+                <a:lnTo>
+                  <a:pt x="2815" y="2812"/>
+                </a:lnTo>
+                <a:lnTo>
+                  <a:pt x="2793" y="2830"/>
+                </a:lnTo>
+                <a:lnTo>
+                  <a:pt x="2769" y="2845"/>
+                </a:lnTo>
+                <a:lnTo>
+                  <a:pt x="2742" y="2857"/>
+                </a:lnTo>
+                <a:lnTo>
+                  <a:pt x="2713" y="2867"/>
+                </a:lnTo>
+                <a:lnTo>
+                  <a:pt x="2684" y="2876"/>
+                </a:lnTo>
+                <a:lnTo>
+                  <a:pt x="2653" y="2884"/>
+                </a:lnTo>
+                <a:lnTo>
+                  <a:pt x="2623" y="2892"/>
+                </a:lnTo>
+                <a:lnTo>
+                  <a:pt x="2593" y="2901"/>
+                </a:lnTo>
+                <a:lnTo>
+                  <a:pt x="2564" y="2911"/>
+                </a:lnTo>
+                <a:lnTo>
+                  <a:pt x="2537" y="2923"/>
+                </a:lnTo>
+                <a:lnTo>
+                  <a:pt x="2512" y="2937"/>
+                </a:lnTo>
+                <a:lnTo>
+                  <a:pt x="2490" y="2955"/>
+                </a:lnTo>
+                <a:lnTo>
+                  <a:pt x="2467" y="2975"/>
+                </a:lnTo>
+                <a:lnTo>
+                  <a:pt x="2447" y="2998"/>
+                </a:lnTo>
+                <a:lnTo>
+                  <a:pt x="2428" y="3022"/>
+                </a:lnTo>
+                <a:lnTo>
+                  <a:pt x="2409" y="3047"/>
+                </a:lnTo>
+                <a:lnTo>
+                  <a:pt x="2390" y="3072"/>
+                </a:lnTo>
+                <a:lnTo>
+                  <a:pt x="2371" y="3096"/>
+                </a:lnTo>
+                <a:lnTo>
+                  <a:pt x="2350" y="3119"/>
+                </a:lnTo>
+                <a:lnTo>
+                  <a:pt x="2329" y="3139"/>
+                </a:lnTo>
+                <a:lnTo>
+                  <a:pt x="2305" y="3156"/>
+                </a:lnTo>
+                <a:lnTo>
+                  <a:pt x="2280" y="3169"/>
+                </a:lnTo>
+                <a:lnTo>
+                  <a:pt x="2250" y="3178"/>
+                </a:lnTo>
+                <a:lnTo>
+                  <a:pt x="2219" y="3182"/>
+                </a:lnTo>
+                <a:lnTo>
+                  <a:pt x="2187" y="3183"/>
+                </a:lnTo>
+                <a:lnTo>
+                  <a:pt x="2153" y="3180"/>
+                </a:lnTo>
+                <a:lnTo>
+                  <a:pt x="2119" y="3176"/>
+                </a:lnTo>
+                <a:lnTo>
+                  <a:pt x="2085" y="3171"/>
+                </a:lnTo>
+                <a:lnTo>
+                  <a:pt x="2051" y="3167"/>
+                </a:lnTo>
+                <a:lnTo>
+                  <a:pt x="2017" y="3165"/>
+                </a:lnTo>
+                <a:lnTo>
+                  <a:pt x="1984" y="3165"/>
+                </a:lnTo>
+                <a:lnTo>
+                  <a:pt x="1953" y="3169"/>
+                </a:lnTo>
+                <a:lnTo>
+                  <a:pt x="1921" y="3177"/>
+                </a:lnTo>
+                <a:lnTo>
+                  <a:pt x="1892" y="3189"/>
+                </a:lnTo>
+                <a:lnTo>
+                  <a:pt x="1862" y="3205"/>
+                </a:lnTo>
+                <a:lnTo>
+                  <a:pt x="1832" y="3221"/>
+                </a:lnTo>
+                <a:lnTo>
+                  <a:pt x="1802" y="3239"/>
+                </a:lnTo>
+                <a:lnTo>
+                  <a:pt x="1773" y="3256"/>
+                </a:lnTo>
+                <a:lnTo>
+                  <a:pt x="1742" y="3271"/>
+                </a:lnTo>
+                <a:lnTo>
+                  <a:pt x="1712" y="3283"/>
+                </a:lnTo>
+                <a:lnTo>
+                  <a:pt x="1681" y="3291"/>
+                </a:lnTo>
+                <a:lnTo>
+                  <a:pt x="1649" y="3294"/>
+                </a:lnTo>
+                <a:lnTo>
+                  <a:pt x="1617" y="3291"/>
+                </a:lnTo>
+                <a:lnTo>
+                  <a:pt x="1586" y="3283"/>
+                </a:lnTo>
+                <a:lnTo>
+                  <a:pt x="1556" y="3271"/>
+                </a:lnTo>
+                <a:lnTo>
+                  <a:pt x="1525" y="3256"/>
+                </a:lnTo>
+                <a:lnTo>
+                  <a:pt x="1496" y="3239"/>
+                </a:lnTo>
+                <a:lnTo>
+                  <a:pt x="1466" y="3221"/>
+                </a:lnTo>
+                <a:lnTo>
+                  <a:pt x="1436" y="3205"/>
+                </a:lnTo>
+                <a:lnTo>
+                  <a:pt x="1406" y="3189"/>
+                </a:lnTo>
+                <a:lnTo>
+                  <a:pt x="1376" y="3177"/>
+                </a:lnTo>
+                <a:lnTo>
+                  <a:pt x="1345" y="3169"/>
+                </a:lnTo>
+                <a:lnTo>
+                  <a:pt x="1314" y="3165"/>
+                </a:lnTo>
+                <a:lnTo>
+                  <a:pt x="1281" y="3165"/>
+                </a:lnTo>
+                <a:lnTo>
+                  <a:pt x="1247" y="3167"/>
+                </a:lnTo>
+                <a:lnTo>
+                  <a:pt x="1213" y="3171"/>
+                </a:lnTo>
+                <a:lnTo>
+                  <a:pt x="1179" y="3176"/>
+                </a:lnTo>
+                <a:lnTo>
+                  <a:pt x="1145" y="3180"/>
+                </a:lnTo>
+                <a:lnTo>
+                  <a:pt x="1111" y="3183"/>
+                </a:lnTo>
+                <a:lnTo>
+                  <a:pt x="1079" y="3182"/>
+                </a:lnTo>
+                <a:lnTo>
+                  <a:pt x="1048" y="3178"/>
+                </a:lnTo>
+                <a:lnTo>
+                  <a:pt x="1018" y="3169"/>
+                </a:lnTo>
+                <a:lnTo>
+                  <a:pt x="993" y="3156"/>
+                </a:lnTo>
+                <a:lnTo>
+                  <a:pt x="969" y="3139"/>
+                </a:lnTo>
+                <a:lnTo>
+                  <a:pt x="948" y="3119"/>
+                </a:lnTo>
+                <a:lnTo>
+                  <a:pt x="927" y="3096"/>
+                </a:lnTo>
+                <a:lnTo>
+                  <a:pt x="908" y="3072"/>
+                </a:lnTo>
+                <a:lnTo>
+                  <a:pt x="889" y="3047"/>
+                </a:lnTo>
+                <a:lnTo>
+                  <a:pt x="870" y="3022"/>
+                </a:lnTo>
+                <a:lnTo>
+                  <a:pt x="851" y="2998"/>
+                </a:lnTo>
+                <a:lnTo>
+                  <a:pt x="831" y="2975"/>
+                </a:lnTo>
+                <a:lnTo>
+                  <a:pt x="808" y="2955"/>
+                </a:lnTo>
+                <a:lnTo>
+                  <a:pt x="786" y="2937"/>
+                </a:lnTo>
+                <a:lnTo>
+                  <a:pt x="761" y="2923"/>
+                </a:lnTo>
+                <a:lnTo>
+                  <a:pt x="734" y="2911"/>
+                </a:lnTo>
+                <a:lnTo>
+                  <a:pt x="705" y="2901"/>
+                </a:lnTo>
+                <a:lnTo>
+                  <a:pt x="675" y="2892"/>
+                </a:lnTo>
+                <a:lnTo>
+                  <a:pt x="645" y="2884"/>
+                </a:lnTo>
+                <a:lnTo>
+                  <a:pt x="614" y="2876"/>
+                </a:lnTo>
+                <a:lnTo>
+                  <a:pt x="585" y="2867"/>
+                </a:lnTo>
+                <a:lnTo>
+                  <a:pt x="556" y="2857"/>
+                </a:lnTo>
+                <a:lnTo>
+                  <a:pt x="529" y="2845"/>
+                </a:lnTo>
+                <a:lnTo>
+                  <a:pt x="505" y="2830"/>
+                </a:lnTo>
+                <a:lnTo>
+                  <a:pt x="483" y="2812"/>
+                </a:lnTo>
+                <a:lnTo>
+                  <a:pt x="465" y="2790"/>
+                </a:lnTo>
+                <a:lnTo>
+                  <a:pt x="450" y="2766"/>
+                </a:lnTo>
+                <a:lnTo>
+                  <a:pt x="438" y="2739"/>
+                </a:lnTo>
+                <a:lnTo>
+                  <a:pt x="428" y="2710"/>
+                </a:lnTo>
+                <a:lnTo>
+                  <a:pt x="419" y="2681"/>
+                </a:lnTo>
+                <a:lnTo>
+                  <a:pt x="411" y="2650"/>
+                </a:lnTo>
+                <a:lnTo>
+                  <a:pt x="403" y="2620"/>
+                </a:lnTo>
+                <a:lnTo>
+                  <a:pt x="394" y="2590"/>
+                </a:lnTo>
+                <a:lnTo>
+                  <a:pt x="384" y="2561"/>
+                </a:lnTo>
+                <a:lnTo>
+                  <a:pt x="372" y="2534"/>
+                </a:lnTo>
+                <a:lnTo>
+                  <a:pt x="358" y="2509"/>
+                </a:lnTo>
+                <a:lnTo>
+                  <a:pt x="340" y="2487"/>
+                </a:lnTo>
+                <a:lnTo>
+                  <a:pt x="320" y="2464"/>
+                </a:lnTo>
+                <a:lnTo>
+                  <a:pt x="297" y="2444"/>
+                </a:lnTo>
+                <a:lnTo>
+                  <a:pt x="272" y="2425"/>
+                </a:lnTo>
+                <a:lnTo>
+                  <a:pt x="247" y="2406"/>
+                </a:lnTo>
+                <a:lnTo>
+                  <a:pt x="222" y="2387"/>
+                </a:lnTo>
+                <a:lnTo>
+                  <a:pt x="198" y="2368"/>
+                </a:lnTo>
+                <a:lnTo>
+                  <a:pt x="175" y="2347"/>
+                </a:lnTo>
+                <a:lnTo>
+                  <a:pt x="155" y="2326"/>
+                </a:lnTo>
+                <a:lnTo>
+                  <a:pt x="138" y="2302"/>
+                </a:lnTo>
+                <a:lnTo>
+                  <a:pt x="125" y="2277"/>
+                </a:lnTo>
+                <a:lnTo>
+                  <a:pt x="116" y="2247"/>
+                </a:lnTo>
+                <a:lnTo>
+                  <a:pt x="112" y="2216"/>
+                </a:lnTo>
+                <a:lnTo>
+                  <a:pt x="111" y="2184"/>
+                </a:lnTo>
+                <a:lnTo>
+                  <a:pt x="114" y="2150"/>
+                </a:lnTo>
+                <a:lnTo>
+                  <a:pt x="118" y="2116"/>
+                </a:lnTo>
+                <a:lnTo>
+                  <a:pt x="123" y="2082"/>
+                </a:lnTo>
+                <a:lnTo>
+                  <a:pt x="127" y="2048"/>
+                </a:lnTo>
+                <a:lnTo>
+                  <a:pt x="129" y="2014"/>
+                </a:lnTo>
+                <a:lnTo>
+                  <a:pt x="129" y="1981"/>
+                </a:lnTo>
+                <a:lnTo>
+                  <a:pt x="125" y="1950"/>
+                </a:lnTo>
+                <a:lnTo>
+                  <a:pt x="117" y="1919"/>
+                </a:lnTo>
+                <a:lnTo>
+                  <a:pt x="105" y="1890"/>
+                </a:lnTo>
+                <a:lnTo>
+                  <a:pt x="90" y="1860"/>
+                </a:lnTo>
+                <a:lnTo>
+                  <a:pt x="73" y="1830"/>
+                </a:lnTo>
+                <a:lnTo>
+                  <a:pt x="55" y="1800"/>
+                </a:lnTo>
+                <a:lnTo>
+                  <a:pt x="38" y="1771"/>
+                </a:lnTo>
+                <a:lnTo>
+                  <a:pt x="23" y="1740"/>
+                </a:lnTo>
+                <a:lnTo>
+                  <a:pt x="11" y="1710"/>
+                </a:lnTo>
+                <a:lnTo>
+                  <a:pt x="3" y="1679"/>
+                </a:lnTo>
+                <a:lnTo>
+                  <a:pt x="0" y="1647"/>
+                </a:lnTo>
+                <a:lnTo>
+                  <a:pt x="3" y="1615"/>
+                </a:lnTo>
+                <a:lnTo>
+                  <a:pt x="11" y="1584"/>
+                </a:lnTo>
+                <a:lnTo>
+                  <a:pt x="23" y="1554"/>
+                </a:lnTo>
+                <a:lnTo>
+                  <a:pt x="38" y="1523"/>
+                </a:lnTo>
+                <a:lnTo>
+                  <a:pt x="55" y="1494"/>
+                </a:lnTo>
+                <a:lnTo>
+                  <a:pt x="73" y="1464"/>
+                </a:lnTo>
+                <a:lnTo>
+                  <a:pt x="90" y="1434"/>
+                </a:lnTo>
+                <a:lnTo>
+                  <a:pt x="105" y="1404"/>
+                </a:lnTo>
+                <a:lnTo>
+                  <a:pt x="117" y="1375"/>
+                </a:lnTo>
+                <a:lnTo>
+                  <a:pt x="125" y="1344"/>
+                </a:lnTo>
+                <a:lnTo>
+                  <a:pt x="129" y="1313"/>
+                </a:lnTo>
+                <a:lnTo>
+                  <a:pt x="129" y="1280"/>
+                </a:lnTo>
+                <a:lnTo>
+                  <a:pt x="127" y="1246"/>
+                </a:lnTo>
+                <a:lnTo>
+                  <a:pt x="123" y="1212"/>
+                </a:lnTo>
+                <a:lnTo>
+                  <a:pt x="118" y="1178"/>
+                </a:lnTo>
+                <a:lnTo>
+                  <a:pt x="114" y="1144"/>
+                </a:lnTo>
+                <a:lnTo>
+                  <a:pt x="111" y="1110"/>
+                </a:lnTo>
+                <a:lnTo>
+                  <a:pt x="112" y="1078"/>
+                </a:lnTo>
+                <a:lnTo>
+                  <a:pt x="116" y="1047"/>
+                </a:lnTo>
+                <a:lnTo>
+                  <a:pt x="125" y="1017"/>
+                </a:lnTo>
+                <a:lnTo>
+                  <a:pt x="138" y="992"/>
+                </a:lnTo>
+                <a:lnTo>
+                  <a:pt x="155" y="968"/>
+                </a:lnTo>
+                <a:lnTo>
+                  <a:pt x="175" y="947"/>
+                </a:lnTo>
+                <a:lnTo>
+                  <a:pt x="198" y="926"/>
+                </a:lnTo>
+                <a:lnTo>
+                  <a:pt x="222" y="907"/>
+                </a:lnTo>
+                <a:lnTo>
+                  <a:pt x="247" y="888"/>
+                </a:lnTo>
+                <a:lnTo>
+                  <a:pt x="272" y="869"/>
+                </a:lnTo>
+                <a:lnTo>
+                  <a:pt x="297" y="850"/>
+                </a:lnTo>
+                <a:lnTo>
+                  <a:pt x="320" y="830"/>
+                </a:lnTo>
+                <a:lnTo>
+                  <a:pt x="340" y="807"/>
+                </a:lnTo>
+                <a:lnTo>
+                  <a:pt x="358" y="785"/>
+                </a:lnTo>
+                <a:lnTo>
+                  <a:pt x="372" y="760"/>
+                </a:lnTo>
+                <a:lnTo>
+                  <a:pt x="384" y="733"/>
+                </a:lnTo>
+                <a:lnTo>
+                  <a:pt x="394" y="704"/>
+                </a:lnTo>
+                <a:lnTo>
+                  <a:pt x="403" y="674"/>
+                </a:lnTo>
+                <a:lnTo>
+                  <a:pt x="411" y="644"/>
+                </a:lnTo>
+                <a:lnTo>
+                  <a:pt x="419" y="613"/>
+                </a:lnTo>
+                <a:lnTo>
+                  <a:pt x="428" y="584"/>
+                </a:lnTo>
+                <a:lnTo>
+                  <a:pt x="438" y="555"/>
+                </a:lnTo>
+                <a:lnTo>
+                  <a:pt x="450" y="528"/>
+                </a:lnTo>
+                <a:lnTo>
+                  <a:pt x="465" y="504"/>
+                </a:lnTo>
+                <a:lnTo>
+                  <a:pt x="483" y="482"/>
+                </a:lnTo>
+                <a:lnTo>
+                  <a:pt x="505" y="464"/>
+                </a:lnTo>
+                <a:lnTo>
+                  <a:pt x="529" y="449"/>
+                </a:lnTo>
+                <a:lnTo>
+                  <a:pt x="556" y="437"/>
+                </a:lnTo>
+                <a:lnTo>
+                  <a:pt x="585" y="427"/>
+                </a:lnTo>
+                <a:lnTo>
+                  <a:pt x="614" y="418"/>
+                </a:lnTo>
+                <a:lnTo>
+                  <a:pt x="645" y="410"/>
+                </a:lnTo>
+                <a:lnTo>
+                  <a:pt x="675" y="402"/>
+                </a:lnTo>
+                <a:lnTo>
+                  <a:pt x="705" y="393"/>
+                </a:lnTo>
+                <a:lnTo>
+                  <a:pt x="734" y="383"/>
+                </a:lnTo>
+                <a:lnTo>
+                  <a:pt x="761" y="371"/>
+                </a:lnTo>
+                <a:lnTo>
+                  <a:pt x="786" y="357"/>
+                </a:lnTo>
+                <a:lnTo>
+                  <a:pt x="808" y="339"/>
+                </a:lnTo>
+                <a:lnTo>
+                  <a:pt x="831" y="319"/>
+                </a:lnTo>
+                <a:lnTo>
+                  <a:pt x="851" y="296"/>
+                </a:lnTo>
+                <a:lnTo>
+                  <a:pt x="870" y="272"/>
+                </a:lnTo>
+                <a:lnTo>
+                  <a:pt x="889" y="247"/>
+                </a:lnTo>
+                <a:lnTo>
+                  <a:pt x="908" y="222"/>
+                </a:lnTo>
+                <a:lnTo>
+                  <a:pt x="927" y="198"/>
+                </a:lnTo>
+                <a:lnTo>
+                  <a:pt x="948" y="175"/>
+                </a:lnTo>
+                <a:lnTo>
+                  <a:pt x="969" y="155"/>
+                </a:lnTo>
+                <a:lnTo>
+                  <a:pt x="993" y="138"/>
+                </a:lnTo>
+                <a:lnTo>
+                  <a:pt x="1018" y="125"/>
+                </a:lnTo>
+                <a:lnTo>
+                  <a:pt x="1048" y="116"/>
+                </a:lnTo>
+                <a:lnTo>
+                  <a:pt x="1079" y="112"/>
+                </a:lnTo>
+                <a:lnTo>
+                  <a:pt x="1111" y="111"/>
+                </a:lnTo>
+                <a:lnTo>
+                  <a:pt x="1145" y="114"/>
+                </a:lnTo>
+                <a:lnTo>
+                  <a:pt x="1179" y="118"/>
+                </a:lnTo>
+                <a:lnTo>
+                  <a:pt x="1213" y="123"/>
+                </a:lnTo>
+                <a:lnTo>
+                  <a:pt x="1247" y="127"/>
+                </a:lnTo>
+                <a:lnTo>
+                  <a:pt x="1281" y="129"/>
+                </a:lnTo>
+                <a:lnTo>
+                  <a:pt x="1314" y="129"/>
+                </a:lnTo>
+                <a:lnTo>
+                  <a:pt x="1345" y="125"/>
+                </a:lnTo>
+                <a:lnTo>
+                  <a:pt x="1376" y="117"/>
+                </a:lnTo>
+                <a:lnTo>
+                  <a:pt x="1406" y="105"/>
+                </a:lnTo>
+                <a:lnTo>
+                  <a:pt x="1436" y="89"/>
+                </a:lnTo>
+                <a:lnTo>
+                  <a:pt x="1466" y="73"/>
+                </a:lnTo>
+                <a:lnTo>
+                  <a:pt x="1496" y="55"/>
+                </a:lnTo>
+                <a:lnTo>
+                  <a:pt x="1525" y="38"/>
+                </a:lnTo>
+                <a:lnTo>
+                  <a:pt x="1556" y="23"/>
+                </a:lnTo>
+                <a:lnTo>
+                  <a:pt x="1586" y="11"/>
+                </a:lnTo>
+                <a:lnTo>
+                  <a:pt x="1617" y="3"/>
+                </a:lnTo>
+                <a:lnTo>
+                  <a:pt x="1649" y="0"/>
+                </a:lnTo>
+                <a:close/>
+              </a:path>
+            </a:pathLst>
+          </a:custGeom>
+          <a:solidFill>
+            <a:schemeClr val="bg2"/>
+          </a:solidFill>
+          <a:ln w="0">
+            <a:noFill/>
+            <a:prstDash val="solid"/>
+            <a:round/>
+            <a:headEnd/>
+            <a:tailEnd/>
+          </a:ln>
+        </p:spPr>
+      </p:sp>
+      <p:sp>
+        <p:nvSpPr>
+          <p:cNvPr id="100" name="Rectangle 99">
+            <a:extLst>
+              <a:ext uri="{FF2B5EF4-FFF2-40B4-BE49-F238E27FC236}">
+                <a16:creationId xmlns:a16="http://schemas.microsoft.com/office/drawing/2014/main" id="{6F1BF92E-23CF-4BFE-9E1F-C359BACFA3C5}"/>
+              </a:ext>
+              <a:ext uri="{C183D7F6-B498-43B3-948B-1728B52AA6E4}">
+                <adec:decorative xmlns:adec="http://schemas.microsoft.com/office/drawing/2017/decorative" val="1"/>
+              </a:ext>
+            </a:extLst>
+          </p:cNvPr>
+          <p:cNvSpPr>
+            <a:spLocks noGrp="1" noRot="1" noChangeAspect="1" noMove="1" noResize="1" noEditPoints="1" noAdjustHandles="1" noChangeArrowheads="1" noChangeShapeType="1" noTextEdit="1"/>
+          </p:cNvSpPr>
+          <p:nvPr>
+            <p:extLst>
+              <p:ext uri="{386F3935-93C4-4BCD-93E2-E3B085C9AB24}">
+                <p16:designElem xmlns:p16="http://schemas.microsoft.com/office/powerpoint/2015/main" val="1"/>
+              </p:ext>
+            </p:extLst>
+          </p:nvPr>
+        </p:nvSpPr>
+        <p:spPr>
+          <a:xfrm>
+            <a:off x="0" y="0"/>
+            <a:ext cx="212598" cy="5143500"/>
+          </a:xfrm>
+          <a:prstGeom prst="rect">
+            <a:avLst/>
+          </a:prstGeom>
+          <a:solidFill>
+            <a:schemeClr val="tx2"/>
+          </a:solidFill>
+          <a:ln>
+            <a:noFill/>
+          </a:ln>
+        </p:spPr>
+        <p:style>
+          <a:lnRef idx="2">
+            <a:schemeClr val="accent1">
+              <a:shade val="50000"/>
+            </a:schemeClr>
+          </a:lnRef>
+          <a:fillRef idx="1">
+            <a:schemeClr val="accent1"/>
+          </a:fillRef>
+          <a:effectRef idx="0">
+            <a:schemeClr val="accent1"/>
+          </a:effectRef>
+          <a:fontRef idx="minor">
+            <a:schemeClr val="lt1"/>
+          </a:fontRef>
+        </p:style>
+      </p:sp>
+      <p:sp useBgFill="1">
+        <p:nvSpPr>
+          <p:cNvPr id="102" name="Rectangle 101">
+            <a:extLst>
+              <a:ext uri="{FF2B5EF4-FFF2-40B4-BE49-F238E27FC236}">
+                <a16:creationId xmlns:a16="http://schemas.microsoft.com/office/drawing/2014/main" id="{1D21332B-FE15-41A6-8919-8563A89EAEDA}"/>
+              </a:ext>
+              <a:ext uri="{C183D7F6-B498-43B3-948B-1728B52AA6E4}">
+                <adec:decorative xmlns:adec="http://schemas.microsoft.com/office/drawing/2017/decorative" val="1"/>
+              </a:ext>
+            </a:extLst>
+          </p:cNvPr>
+          <p:cNvSpPr>
+            <a:spLocks noGrp="1" noRot="1" noChangeAspect="1" noMove="1" noResize="1" noEditPoints="1" noAdjustHandles="1" noChangeArrowheads="1" noChangeShapeType="1" noTextEdit="1"/>
+          </p:cNvSpPr>
+          <p:nvPr>
+            <p:extLst>
+              <p:ext uri="{386F3935-93C4-4BCD-93E2-E3B085C9AB24}">
+                <p16:designElem xmlns:p16="http://schemas.microsoft.com/office/powerpoint/2015/main" val="1"/>
+              </p:ext>
+            </p:extLst>
+          </p:nvPr>
+        </p:nvSpPr>
+        <p:spPr bwMode="white">
+          <a:xfrm>
+            <a:off x="0" y="0"/>
+            <a:ext cx="9144000" cy="5143500"/>
+          </a:xfrm>
+          <a:prstGeom prst="rect">
+            <a:avLst/>
+          </a:prstGeom>
+          <a:ln>
+            <a:noFill/>
+          </a:ln>
+        </p:spPr>
+        <p:style>
+          <a:lnRef idx="2">
+            <a:schemeClr val="accent1">
+              <a:shade val="50000"/>
+            </a:schemeClr>
+          </a:lnRef>
+          <a:fillRef idx="1">
+            <a:schemeClr val="accent1"/>
+          </a:fillRef>
+          <a:effectRef idx="0">
+            <a:schemeClr val="accent1"/>
+          </a:effectRef>
+          <a:fontRef idx="minor">
+            <a:schemeClr val="lt1"/>
+          </a:fontRef>
+        </p:style>
+        <p:txBody>
+          <a:bodyPr rot="0" spcFirstLastPara="0" vert="horz" wrap="square" lIns="91440" tIns="45720" rIns="91440" bIns="45720" numCol="1" spcCol="0" rtlCol="0" fromWordArt="0" anchor="ctr" anchorCtr="0" forceAA="0" compatLnSpc="1">
+            <a:prstTxWarp prst="textNoShape">
+              <a:avLst/>
+            </a:prstTxWarp>
+            <a:noAutofit/>
+          </a:bodyPr>
+          <a:lstStyle>
+            <a:defPPr>
+              <a:defRPr lang="en-US"/>
+            </a:defPPr>
+            <a:lvl1pPr marL="0" algn="l" defTabSz="914400" rtl="0" eaLnBrk="1" latinLnBrk="0" hangingPunct="1">
+              <a:defRPr sz="1800" kern="1200">
+                <a:solidFill>
+                  <a:schemeClr val="lt1"/>
+                </a:solidFill>
+                <a:latin typeface="+mn-lt"/>
+                <a:ea typeface="+mn-ea"/>
+                <a:cs typeface="+mn-cs"/>
+              </a:defRPr>
+            </a:lvl1pPr>
+            <a:lvl2pPr marL="457200" algn="l" defTabSz="914400" rtl="0" eaLnBrk="1" latinLnBrk="0" hangingPunct="1">
+              <a:defRPr sz="1800" kern="1200">
+                <a:solidFill>
+                  <a:schemeClr val="lt1"/>
+                </a:solidFill>
+                <a:latin typeface="+mn-lt"/>
+                <a:ea typeface="+mn-ea"/>
+                <a:cs typeface="+mn-cs"/>
+              </a:defRPr>
+            </a:lvl2pPr>
+            <a:lvl3pPr marL="914400" algn="l" defTabSz="914400" rtl="0" eaLnBrk="1" latinLnBrk="0" hangingPunct="1">
+              <a:defRPr sz="1800" kern="1200">
+                <a:solidFill>
+                  <a:schemeClr val="lt1"/>
+                </a:solidFill>
+                <a:latin typeface="+mn-lt"/>
+                <a:ea typeface="+mn-ea"/>
+                <a:cs typeface="+mn-cs"/>
+              </a:defRPr>
+            </a:lvl3pPr>
+            <a:lvl4pPr marL="1371600" algn="l" defTabSz="914400" rtl="0" eaLnBrk="1" latinLnBrk="0" hangingPunct="1">
+              <a:defRPr sz="1800" kern="1200">
+                <a:solidFill>
+                  <a:schemeClr val="lt1"/>
+                </a:solidFill>
+                <a:latin typeface="+mn-lt"/>
+                <a:ea typeface="+mn-ea"/>
+                <a:cs typeface="+mn-cs"/>
+              </a:defRPr>
+            </a:lvl4pPr>
+            <a:lvl5pPr marL="1828800" algn="l" defTabSz="914400" rtl="0" eaLnBrk="1" latinLnBrk="0" hangingPunct="1">
+              <a:defRPr sz="1800" kern="1200">
+                <a:solidFill>
+                  <a:schemeClr val="lt1"/>
+                </a:solidFill>
+                <a:latin typeface="+mn-lt"/>
+                <a:ea typeface="+mn-ea"/>
+                <a:cs typeface="+mn-cs"/>
+              </a:defRPr>
+            </a:lvl5pPr>
+            <a:lvl6pPr marL="2286000" algn="l" defTabSz="914400" rtl="0" eaLnBrk="1" latinLnBrk="0" hangingPunct="1">
+              <a:defRPr sz="1800" kern="1200">
+                <a:solidFill>
+                  <a:schemeClr val="lt1"/>
+                </a:solidFill>
+                <a:latin typeface="+mn-lt"/>
+                <a:ea typeface="+mn-ea"/>
+                <a:cs typeface="+mn-cs"/>
+              </a:defRPr>
+            </a:lvl6pPr>
+            <a:lvl7pPr marL="2743200" algn="l" defTabSz="914400" rtl="0" eaLnBrk="1" latinLnBrk="0" hangingPunct="1">
+              <a:defRPr sz="1800" kern="1200">
+                <a:solidFill>
+                  <a:schemeClr val="lt1"/>
+                </a:solidFill>
+                <a:latin typeface="+mn-lt"/>
+                <a:ea typeface="+mn-ea"/>
+                <a:cs typeface="+mn-cs"/>
+              </a:defRPr>
+            </a:lvl7pPr>
+            <a:lvl8pPr marL="3200400" algn="l" defTabSz="914400" rtl="0" eaLnBrk="1" latinLnBrk="0" hangingPunct="1">
+              <a:defRPr sz="1800" kern="1200">
+                <a:solidFill>
+                  <a:schemeClr val="lt1"/>
+                </a:solidFill>
+                <a:latin typeface="+mn-lt"/>
+                <a:ea typeface="+mn-ea"/>
+                <a:cs typeface="+mn-cs"/>
+              </a:defRPr>
+            </a:lvl8pPr>
+            <a:lvl9pPr marL="3657600" algn="l" defTabSz="914400" rtl="0" eaLnBrk="1" latinLnBrk="0" hangingPunct="1">
+              <a:defRPr sz="1800" kern="1200">
+                <a:solidFill>
+                  <a:schemeClr val="lt1"/>
+                </a:solidFill>
+                <a:latin typeface="+mn-lt"/>
+                <a:ea typeface="+mn-ea"/>
+                <a:cs typeface="+mn-cs"/>
+              </a:defRPr>
+            </a:lvl9pPr>
+          </a:lstStyle>
+          <a:p>
+            <a:pPr algn="ctr"/>
+            <a:endParaRPr lang="en-US"/>
+          </a:p>
+        </p:txBody>
+      </p:sp>
+      <p:sp>
+        <p:nvSpPr>
           <p:cNvPr id="60" name="Google Shape;60;p14"/>
           <p:cNvSpPr txBox="1">
             <a:spLocks noGrp="1"/>
@@ -13567,42 +14899,576 @@
         </p:nvSpPr>
         <p:spPr>
           <a:xfrm>
-            <a:off x="406293" y="227457"/>
-            <a:ext cx="8520600" cy="841800"/>
+            <a:off x="771675" y="146157"/>
+            <a:ext cx="7600649" cy="1393426"/>
           </a:xfrm>
           <a:prstGeom prst="rect">
             <a:avLst/>
           </a:prstGeom>
         </p:spPr>
         <p:txBody>
-          <a:bodyPr spcFirstLastPara="1" wrap="square" lIns="91425" tIns="91425" rIns="91425" bIns="91425" anchor="ctr" anchorCtr="0">
-            <a:noAutofit/>
+          <a:bodyPr spcFirstLastPara="1" vert="horz" lIns="91440" tIns="45720" rIns="91440" bIns="45720" rtlCol="0" anchor="t" anchorCtr="0">
+            <a:normAutofit/>
           </a:bodyPr>
           <a:lstStyle/>
           <a:p>
-            <a:pPr marL="0" lvl="0" indent="0" algn="ctr" rtl="0">
+            <a:pPr marL="0" lvl="0" indent="0" defTabSz="914400">
               <a:spcBef>
-                <a:spcPts val="0"/>
+                <a:spcPct val="0"/>
               </a:spcBef>
               <a:spcAft>
                 <a:spcPts val="0"/>
               </a:spcAft>
-              <a:buNone/>
             </a:pPr>
             <a:r>
-              <a:rPr lang="en" dirty="0"/>
+              <a:rPr lang="en-US" sz="5400" spc="800" dirty="0"/>
               <a:t>Elevator pitch</a:t>
             </a:r>
-            <a:endParaRPr dirty="0"/>
           </a:p>
         </p:txBody>
       </p:sp>
+      <p:sp>
+        <p:nvSpPr>
+          <p:cNvPr id="104" name="Freeform 6">
+            <a:extLst>
+              <a:ext uri="{FF2B5EF4-FFF2-40B4-BE49-F238E27FC236}">
+                <a16:creationId xmlns:a16="http://schemas.microsoft.com/office/drawing/2014/main" id="{439F6CA3-780D-4C3A-A889-C705E7E7D12D}"/>
+              </a:ext>
+              <a:ext uri="{C183D7F6-B498-43B3-948B-1728B52AA6E4}">
+                <adec:decorative xmlns:adec="http://schemas.microsoft.com/office/drawing/2017/decorative" val="1"/>
+              </a:ext>
+            </a:extLst>
+          </p:cNvPr>
+          <p:cNvSpPr>
+            <a:spLocks noGrp="1" noRot="1" noChangeAspect="1" noMove="1" noResize="1" noEditPoints="1" noAdjustHandles="1" noChangeArrowheads="1" noChangeShapeType="1" noTextEdit="1"/>
+          </p:cNvSpPr>
+          <p:nvPr>
+            <p:extLst>
+              <p:ext uri="{386F3935-93C4-4BCD-93E2-E3B085C9AB24}">
+                <p16:designElem xmlns:p16="http://schemas.microsoft.com/office/powerpoint/2015/main" val="1"/>
+              </p:ext>
+            </p:extLst>
+          </p:nvPr>
+        </p:nvSpPr>
+        <p:spPr bwMode="auto">
+          <a:xfrm>
+            <a:off x="0" y="0"/>
+            <a:ext cx="664368" cy="5143500"/>
+          </a:xfrm>
+          <a:custGeom>
+            <a:avLst/>
+            <a:gdLst/>
+            <a:ahLst/>
+            <a:cxnLst/>
+            <a:rect l="0" t="0" r="r" b="b"/>
+            <a:pathLst>
+              <a:path w="558" h="4320">
+                <a:moveTo>
+                  <a:pt x="0" y="0"/>
+                </a:moveTo>
+                <a:lnTo>
+                  <a:pt x="447" y="0"/>
+                </a:lnTo>
+                <a:lnTo>
+                  <a:pt x="448" y="43"/>
+                </a:lnTo>
+                <a:lnTo>
+                  <a:pt x="453" y="81"/>
+                </a:lnTo>
+                <a:lnTo>
+                  <a:pt x="460" y="114"/>
+                </a:lnTo>
+                <a:lnTo>
+                  <a:pt x="469" y="143"/>
+                </a:lnTo>
+                <a:lnTo>
+                  <a:pt x="479" y="169"/>
+                </a:lnTo>
+                <a:lnTo>
+                  <a:pt x="491" y="192"/>
+                </a:lnTo>
+                <a:lnTo>
+                  <a:pt x="503" y="216"/>
+                </a:lnTo>
+                <a:lnTo>
+                  <a:pt x="515" y="240"/>
+                </a:lnTo>
+                <a:lnTo>
+                  <a:pt x="525" y="263"/>
+                </a:lnTo>
+                <a:lnTo>
+                  <a:pt x="535" y="289"/>
+                </a:lnTo>
+                <a:lnTo>
+                  <a:pt x="545" y="318"/>
+                </a:lnTo>
+                <a:lnTo>
+                  <a:pt x="552" y="351"/>
+                </a:lnTo>
+                <a:lnTo>
+                  <a:pt x="556" y="389"/>
+                </a:lnTo>
+                <a:lnTo>
+                  <a:pt x="558" y="432"/>
+                </a:lnTo>
+                <a:lnTo>
+                  <a:pt x="556" y="475"/>
+                </a:lnTo>
+                <a:lnTo>
+                  <a:pt x="552" y="513"/>
+                </a:lnTo>
+                <a:lnTo>
+                  <a:pt x="545" y="546"/>
+                </a:lnTo>
+                <a:lnTo>
+                  <a:pt x="535" y="575"/>
+                </a:lnTo>
+                <a:lnTo>
+                  <a:pt x="525" y="601"/>
+                </a:lnTo>
+                <a:lnTo>
+                  <a:pt x="515" y="624"/>
+                </a:lnTo>
+                <a:lnTo>
+                  <a:pt x="503" y="648"/>
+                </a:lnTo>
+                <a:lnTo>
+                  <a:pt x="491" y="672"/>
+                </a:lnTo>
+                <a:lnTo>
+                  <a:pt x="479" y="695"/>
+                </a:lnTo>
+                <a:lnTo>
+                  <a:pt x="469" y="721"/>
+                </a:lnTo>
+                <a:lnTo>
+                  <a:pt x="460" y="750"/>
+                </a:lnTo>
+                <a:lnTo>
+                  <a:pt x="453" y="783"/>
+                </a:lnTo>
+                <a:lnTo>
+                  <a:pt x="448" y="821"/>
+                </a:lnTo>
+                <a:lnTo>
+                  <a:pt x="447" y="864"/>
+                </a:lnTo>
+                <a:lnTo>
+                  <a:pt x="448" y="907"/>
+                </a:lnTo>
+                <a:lnTo>
+                  <a:pt x="453" y="945"/>
+                </a:lnTo>
+                <a:lnTo>
+                  <a:pt x="460" y="978"/>
+                </a:lnTo>
+                <a:lnTo>
+                  <a:pt x="469" y="1007"/>
+                </a:lnTo>
+                <a:lnTo>
+                  <a:pt x="479" y="1033"/>
+                </a:lnTo>
+                <a:lnTo>
+                  <a:pt x="491" y="1056"/>
+                </a:lnTo>
+                <a:lnTo>
+                  <a:pt x="503" y="1080"/>
+                </a:lnTo>
+                <a:lnTo>
+                  <a:pt x="515" y="1104"/>
+                </a:lnTo>
+                <a:lnTo>
+                  <a:pt x="525" y="1127"/>
+                </a:lnTo>
+                <a:lnTo>
+                  <a:pt x="535" y="1153"/>
+                </a:lnTo>
+                <a:lnTo>
+                  <a:pt x="545" y="1182"/>
+                </a:lnTo>
+                <a:lnTo>
+                  <a:pt x="552" y="1215"/>
+                </a:lnTo>
+                <a:lnTo>
+                  <a:pt x="556" y="1253"/>
+                </a:lnTo>
+                <a:lnTo>
+                  <a:pt x="558" y="1296"/>
+                </a:lnTo>
+                <a:lnTo>
+                  <a:pt x="556" y="1339"/>
+                </a:lnTo>
+                <a:lnTo>
+                  <a:pt x="552" y="1377"/>
+                </a:lnTo>
+                <a:lnTo>
+                  <a:pt x="545" y="1410"/>
+                </a:lnTo>
+                <a:lnTo>
+                  <a:pt x="535" y="1439"/>
+                </a:lnTo>
+                <a:lnTo>
+                  <a:pt x="525" y="1465"/>
+                </a:lnTo>
+                <a:lnTo>
+                  <a:pt x="515" y="1488"/>
+                </a:lnTo>
+                <a:lnTo>
+                  <a:pt x="503" y="1512"/>
+                </a:lnTo>
+                <a:lnTo>
+                  <a:pt x="491" y="1536"/>
+                </a:lnTo>
+                <a:lnTo>
+                  <a:pt x="479" y="1559"/>
+                </a:lnTo>
+                <a:lnTo>
+                  <a:pt x="469" y="1585"/>
+                </a:lnTo>
+                <a:lnTo>
+                  <a:pt x="460" y="1614"/>
+                </a:lnTo>
+                <a:lnTo>
+                  <a:pt x="453" y="1647"/>
+                </a:lnTo>
+                <a:lnTo>
+                  <a:pt x="448" y="1685"/>
+                </a:lnTo>
+                <a:lnTo>
+                  <a:pt x="447" y="1728"/>
+                </a:lnTo>
+                <a:lnTo>
+                  <a:pt x="448" y="1771"/>
+                </a:lnTo>
+                <a:lnTo>
+                  <a:pt x="453" y="1809"/>
+                </a:lnTo>
+                <a:lnTo>
+                  <a:pt x="460" y="1842"/>
+                </a:lnTo>
+                <a:lnTo>
+                  <a:pt x="469" y="1871"/>
+                </a:lnTo>
+                <a:lnTo>
+                  <a:pt x="479" y="1897"/>
+                </a:lnTo>
+                <a:lnTo>
+                  <a:pt x="491" y="1920"/>
+                </a:lnTo>
+                <a:lnTo>
+                  <a:pt x="503" y="1944"/>
+                </a:lnTo>
+                <a:lnTo>
+                  <a:pt x="515" y="1968"/>
+                </a:lnTo>
+                <a:lnTo>
+                  <a:pt x="525" y="1991"/>
+                </a:lnTo>
+                <a:lnTo>
+                  <a:pt x="535" y="2017"/>
+                </a:lnTo>
+                <a:lnTo>
+                  <a:pt x="545" y="2046"/>
+                </a:lnTo>
+                <a:lnTo>
+                  <a:pt x="552" y="2079"/>
+                </a:lnTo>
+                <a:lnTo>
+                  <a:pt x="556" y="2117"/>
+                </a:lnTo>
+                <a:lnTo>
+                  <a:pt x="558" y="2159"/>
+                </a:lnTo>
+                <a:lnTo>
+                  <a:pt x="556" y="2203"/>
+                </a:lnTo>
+                <a:lnTo>
+                  <a:pt x="552" y="2241"/>
+                </a:lnTo>
+                <a:lnTo>
+                  <a:pt x="545" y="2274"/>
+                </a:lnTo>
+                <a:lnTo>
+                  <a:pt x="535" y="2303"/>
+                </a:lnTo>
+                <a:lnTo>
+                  <a:pt x="525" y="2329"/>
+                </a:lnTo>
+                <a:lnTo>
+                  <a:pt x="515" y="2352"/>
+                </a:lnTo>
+                <a:lnTo>
+                  <a:pt x="503" y="2376"/>
+                </a:lnTo>
+                <a:lnTo>
+                  <a:pt x="491" y="2400"/>
+                </a:lnTo>
+                <a:lnTo>
+                  <a:pt x="479" y="2423"/>
+                </a:lnTo>
+                <a:lnTo>
+                  <a:pt x="469" y="2449"/>
+                </a:lnTo>
+                <a:lnTo>
+                  <a:pt x="460" y="2478"/>
+                </a:lnTo>
+                <a:lnTo>
+                  <a:pt x="453" y="2511"/>
+                </a:lnTo>
+                <a:lnTo>
+                  <a:pt x="448" y="2549"/>
+                </a:lnTo>
+                <a:lnTo>
+                  <a:pt x="447" y="2592"/>
+                </a:lnTo>
+                <a:lnTo>
+                  <a:pt x="448" y="2635"/>
+                </a:lnTo>
+                <a:lnTo>
+                  <a:pt x="453" y="2673"/>
+                </a:lnTo>
+                <a:lnTo>
+                  <a:pt x="460" y="2706"/>
+                </a:lnTo>
+                <a:lnTo>
+                  <a:pt x="469" y="2735"/>
+                </a:lnTo>
+                <a:lnTo>
+                  <a:pt x="479" y="2761"/>
+                </a:lnTo>
+                <a:lnTo>
+                  <a:pt x="491" y="2784"/>
+                </a:lnTo>
+                <a:lnTo>
+                  <a:pt x="515" y="2832"/>
+                </a:lnTo>
+                <a:lnTo>
+                  <a:pt x="525" y="2855"/>
+                </a:lnTo>
+                <a:lnTo>
+                  <a:pt x="535" y="2881"/>
+                </a:lnTo>
+                <a:lnTo>
+                  <a:pt x="545" y="2910"/>
+                </a:lnTo>
+                <a:lnTo>
+                  <a:pt x="552" y="2943"/>
+                </a:lnTo>
+                <a:lnTo>
+                  <a:pt x="556" y="2981"/>
+                </a:lnTo>
+                <a:lnTo>
+                  <a:pt x="558" y="3024"/>
+                </a:lnTo>
+                <a:lnTo>
+                  <a:pt x="556" y="3067"/>
+                </a:lnTo>
+                <a:lnTo>
+                  <a:pt x="552" y="3105"/>
+                </a:lnTo>
+                <a:lnTo>
+                  <a:pt x="545" y="3138"/>
+                </a:lnTo>
+                <a:lnTo>
+                  <a:pt x="535" y="3167"/>
+                </a:lnTo>
+                <a:lnTo>
+                  <a:pt x="525" y="3193"/>
+                </a:lnTo>
+                <a:lnTo>
+                  <a:pt x="515" y="3216"/>
+                </a:lnTo>
+                <a:lnTo>
+                  <a:pt x="503" y="3240"/>
+                </a:lnTo>
+                <a:lnTo>
+                  <a:pt x="491" y="3264"/>
+                </a:lnTo>
+                <a:lnTo>
+                  <a:pt x="479" y="3287"/>
+                </a:lnTo>
+                <a:lnTo>
+                  <a:pt x="469" y="3313"/>
+                </a:lnTo>
+                <a:lnTo>
+                  <a:pt x="460" y="3342"/>
+                </a:lnTo>
+                <a:lnTo>
+                  <a:pt x="453" y="3375"/>
+                </a:lnTo>
+                <a:lnTo>
+                  <a:pt x="448" y="3413"/>
+                </a:lnTo>
+                <a:lnTo>
+                  <a:pt x="447" y="3456"/>
+                </a:lnTo>
+                <a:lnTo>
+                  <a:pt x="448" y="3499"/>
+                </a:lnTo>
+                <a:lnTo>
+                  <a:pt x="453" y="3537"/>
+                </a:lnTo>
+                <a:lnTo>
+                  <a:pt x="460" y="3570"/>
+                </a:lnTo>
+                <a:lnTo>
+                  <a:pt x="469" y="3599"/>
+                </a:lnTo>
+                <a:lnTo>
+                  <a:pt x="479" y="3625"/>
+                </a:lnTo>
+                <a:lnTo>
+                  <a:pt x="491" y="3648"/>
+                </a:lnTo>
+                <a:lnTo>
+                  <a:pt x="503" y="3672"/>
+                </a:lnTo>
+                <a:lnTo>
+                  <a:pt x="515" y="3696"/>
+                </a:lnTo>
+                <a:lnTo>
+                  <a:pt x="525" y="3719"/>
+                </a:lnTo>
+                <a:lnTo>
+                  <a:pt x="535" y="3745"/>
+                </a:lnTo>
+                <a:lnTo>
+                  <a:pt x="545" y="3774"/>
+                </a:lnTo>
+                <a:lnTo>
+                  <a:pt x="552" y="3807"/>
+                </a:lnTo>
+                <a:lnTo>
+                  <a:pt x="556" y="3845"/>
+                </a:lnTo>
+                <a:lnTo>
+                  <a:pt x="558" y="3888"/>
+                </a:lnTo>
+                <a:lnTo>
+                  <a:pt x="556" y="3931"/>
+                </a:lnTo>
+                <a:lnTo>
+                  <a:pt x="552" y="3969"/>
+                </a:lnTo>
+                <a:lnTo>
+                  <a:pt x="545" y="4002"/>
+                </a:lnTo>
+                <a:lnTo>
+                  <a:pt x="535" y="4031"/>
+                </a:lnTo>
+                <a:lnTo>
+                  <a:pt x="525" y="4057"/>
+                </a:lnTo>
+                <a:lnTo>
+                  <a:pt x="515" y="4080"/>
+                </a:lnTo>
+                <a:lnTo>
+                  <a:pt x="503" y="4104"/>
+                </a:lnTo>
+                <a:lnTo>
+                  <a:pt x="491" y="4128"/>
+                </a:lnTo>
+                <a:lnTo>
+                  <a:pt x="479" y="4151"/>
+                </a:lnTo>
+                <a:lnTo>
+                  <a:pt x="469" y="4177"/>
+                </a:lnTo>
+                <a:lnTo>
+                  <a:pt x="460" y="4206"/>
+                </a:lnTo>
+                <a:lnTo>
+                  <a:pt x="453" y="4239"/>
+                </a:lnTo>
+                <a:lnTo>
+                  <a:pt x="448" y="4277"/>
+                </a:lnTo>
+                <a:lnTo>
+                  <a:pt x="447" y="4320"/>
+                </a:lnTo>
+                <a:lnTo>
+                  <a:pt x="0" y="4320"/>
+                </a:lnTo>
+                <a:lnTo>
+                  <a:pt x="0" y="0"/>
+                </a:lnTo>
+                <a:close/>
+              </a:path>
+            </a:pathLst>
+          </a:custGeom>
+          <a:solidFill>
+            <a:schemeClr val="tx2"/>
+          </a:solidFill>
+          <a:ln w="0">
+            <a:noFill/>
+            <a:prstDash val="solid"/>
+            <a:round/>
+            <a:headEnd/>
+            <a:tailEnd/>
+          </a:ln>
+        </p:spPr>
+      </p:sp>
+      <p:sp>
+        <p:nvSpPr>
+          <p:cNvPr id="106" name="Rectangle 105">
+            <a:extLst>
+              <a:ext uri="{FF2B5EF4-FFF2-40B4-BE49-F238E27FC236}">
+                <a16:creationId xmlns:a16="http://schemas.microsoft.com/office/drawing/2014/main" id="{E6335BA4-3C40-424B-A885-29B1007B802A}"/>
+              </a:ext>
+              <a:ext uri="{C183D7F6-B498-43B3-948B-1728B52AA6E4}">
+                <adec:decorative xmlns:adec="http://schemas.microsoft.com/office/drawing/2017/decorative" val="1"/>
+              </a:ext>
+            </a:extLst>
+          </p:cNvPr>
+          <p:cNvSpPr>
+            <a:spLocks noGrp="1" noRot="1" noChangeAspect="1" noMove="1" noResize="1" noEditPoints="1" noAdjustHandles="1" noChangeArrowheads="1" noChangeShapeType="1" noTextEdit="1"/>
+          </p:cNvSpPr>
+          <p:nvPr>
+            <p:extLst>
+              <p:ext uri="{386F3935-93C4-4BCD-93E2-E3B085C9AB24}">
+                <p16:designElem xmlns:p16="http://schemas.microsoft.com/office/powerpoint/2015/main" val="1"/>
+              </p:ext>
+            </p:extLst>
+          </p:nvPr>
+        </p:nvSpPr>
+        <p:spPr>
+          <a:xfrm>
+            <a:off x="8931402" y="0"/>
+            <a:ext cx="212598" cy="5143500"/>
+          </a:xfrm>
+          <a:prstGeom prst="rect">
+            <a:avLst/>
+          </a:prstGeom>
+          <a:solidFill>
+            <a:schemeClr val="accent1"/>
+          </a:solidFill>
+          <a:ln>
+            <a:noFill/>
+          </a:ln>
+        </p:spPr>
+        <p:style>
+          <a:lnRef idx="2">
+            <a:schemeClr val="accent1">
+              <a:shade val="50000"/>
+            </a:schemeClr>
+          </a:lnRef>
+          <a:fillRef idx="1">
+            <a:schemeClr val="accent1"/>
+          </a:fillRef>
+          <a:effectRef idx="0">
+            <a:schemeClr val="accent1"/>
+          </a:effectRef>
+          <a:fontRef idx="minor">
+            <a:schemeClr val="lt1"/>
+          </a:fontRef>
+        </p:style>
+      </p:sp>
       <p:pic>
         <p:nvPicPr>
-          <p:cNvPr id="3" name="Picture 2">
+          <p:cNvPr id="6" name="Picture 5">
             <a:extLst>
               <a:ext uri="{FF2B5EF4-FFF2-40B4-BE49-F238E27FC236}">
-                <a16:creationId xmlns:a16="http://schemas.microsoft.com/office/drawing/2014/main" id="{0105DE81-7876-4EB3-B450-B0E9EDCF0412}"/>
+                <a16:creationId xmlns:a16="http://schemas.microsoft.com/office/drawing/2014/main" id="{DE6AA600-700F-4718-8618-6B2664DF9FB0}"/>
               </a:ext>
             </a:extLst>
           </p:cNvPr>
@@ -13619,12 +15485,30 @@
         </p:blipFill>
         <p:spPr>
           <a:xfrm>
-            <a:off x="1128319" y="1233887"/>
-            <a:ext cx="6887362" cy="2675725"/>
+            <a:off x="1978443" y="1456737"/>
+            <a:ext cx="5444836" cy="2750819"/>
           </a:xfrm>
           <a:prstGeom prst="rect">
             <a:avLst/>
           </a:prstGeom>
+          <a:solidFill>
+            <a:srgbClr val="000000">
+              <a:shade val="95000"/>
+            </a:srgbClr>
+          </a:solidFill>
+          <a:ln w="444500" cap="sq">
+            <a:solidFill>
+              <a:srgbClr val="000000"/>
+            </a:solidFill>
+            <a:miter lim="800000"/>
+          </a:ln>
+          <a:effectLst>
+            <a:outerShdw blurRad="254000" dist="190500" dir="2700000" sy="90000" algn="bl" rotWithShape="0">
+              <a:srgbClr val="000000">
+                <a:alpha val="40000"/>
+              </a:srgbClr>
+            </a:outerShdw>
+          </a:effectLst>
         </p:spPr>
       </p:pic>
     </p:spTree>
@@ -13719,12 +15603,6 @@
           </a:bodyPr>
           <a:lstStyle/>
           <a:p>
-            <a:r>
-              <a:rPr lang="en-AU" dirty="0"/>
-              <a:t>Motivation </a:t>
-            </a:r>
-          </a:p>
-          <a:p>
             <a:endParaRPr lang="en-AU" dirty="0"/>
           </a:p>
           <a:p>
@@ -14022,48 +15900,388 @@
           </a:lstStyle>
           <a:p>
             <a:r>
-              <a:rPr lang="en-AU" dirty="0"/>
+              <a:rPr lang="en-AU" dirty="0">
+                <a:solidFill>
+                  <a:schemeClr val="tx1"/>
+                </a:solidFill>
+              </a:rPr>
               <a:t>User Story </a:t>
             </a:r>
           </a:p>
           <a:p>
             <a:pPr lvl="1"/>
             <a:r>
-              <a:rPr lang="en-AU" dirty="0"/>
+              <a:rPr lang="en-AU" dirty="0">
+                <a:solidFill>
+                  <a:schemeClr val="tx1"/>
+                </a:solidFill>
+              </a:rPr>
               <a:t>When l open the app, I am presented with a selection of conservative, balanced or aggressive risk tolerance options;</a:t>
             </a:r>
           </a:p>
           <a:p>
             <a:pPr lvl="1"/>
             <a:r>
-              <a:rPr lang="en-AU" dirty="0"/>
+              <a:rPr lang="en-AU" dirty="0">
+                <a:solidFill>
+                  <a:schemeClr val="tx1"/>
+                </a:solidFill>
+              </a:rPr>
               <a:t>If l know my risk tolerance, I select an option that aligns with my risk tolerance and l am presented with stocks that align my risk profile; </a:t>
             </a:r>
           </a:p>
           <a:p>
             <a:pPr lvl="1"/>
             <a:r>
-              <a:rPr lang="en-AU" dirty="0"/>
+              <a:rPr lang="en-AU" dirty="0">
+                <a:solidFill>
+                  <a:schemeClr val="tx1"/>
+                </a:solidFill>
+              </a:rPr>
               <a:t>If l don’t know my risk profile, I select the option to participate in a quiz that is designed to determine my risk tolerance based on a set of carefully selected questions and a set algorithm; </a:t>
             </a:r>
           </a:p>
           <a:p>
             <a:pPr lvl="1"/>
             <a:r>
-              <a:rPr lang="en-AU" dirty="0"/>
-              <a:t>Once my risk tolerance is determined from quiz, I am presented with a selection of stocks that align my risk profile;</a:t>
+              <a:rPr lang="en-AU" dirty="0">
+                <a:solidFill>
+                  <a:schemeClr val="tx1"/>
+                </a:solidFill>
+              </a:rPr>
+              <a:t>Once my risk tolerance is determined from the quiz, I am presented with a selection of stocks that align my risk profile;</a:t>
             </a:r>
           </a:p>
           <a:p>
             <a:pPr lvl="1"/>
             <a:r>
-              <a:rPr lang="en-AU" dirty="0"/>
+              <a:rPr lang="en-AU" dirty="0">
+                <a:solidFill>
+                  <a:schemeClr val="tx1"/>
+                </a:solidFill>
+              </a:rPr>
               <a:t>When l click on each stock suggestion, I am presented with top news stories about my recommended stocks;</a:t>
             </a:r>
           </a:p>
           <a:p>
             <a:pPr lvl="1"/>
             <a:endParaRPr lang="en-AU" dirty="0"/>
+          </a:p>
+          <a:p>
+            <a:pPr lvl="1"/>
+            <a:endParaRPr lang="en-AU" dirty="0"/>
+          </a:p>
+          <a:p>
+            <a:pPr lvl="1"/>
+            <a:endParaRPr lang="en-AU" dirty="0"/>
+          </a:p>
+          <a:p>
+            <a:pPr lvl="1"/>
+            <a:endParaRPr lang="en-AU" dirty="0"/>
+          </a:p>
+          <a:p>
+            <a:pPr marL="114300" indent="0">
+              <a:buFont typeface="Calibri" panose="020F0502020204030204" pitchFamily="34" charset="0"/>
+              <a:buNone/>
+            </a:pPr>
+            <a:r>
+              <a:rPr lang="en-AU" dirty="0"/>
+              <a:t> </a:t>
+            </a:r>
+          </a:p>
+        </p:txBody>
+      </p:sp>
+      <p:sp>
+        <p:nvSpPr>
+          <p:cNvPr id="7" name="Google Shape;66;p15">
+            <a:extLst>
+              <a:ext uri="{FF2B5EF4-FFF2-40B4-BE49-F238E27FC236}">
+                <a16:creationId xmlns:a16="http://schemas.microsoft.com/office/drawing/2014/main" id="{56F393AF-C6A5-4A7B-9E35-B912CCA5DB7E}"/>
+              </a:ext>
+            </a:extLst>
+          </p:cNvPr>
+          <p:cNvSpPr txBox="1">
+            <a:spLocks/>
+          </p:cNvSpPr>
+          <p:nvPr/>
+        </p:nvSpPr>
+        <p:spPr>
+          <a:xfrm>
+            <a:off x="-139998" y="684133"/>
+            <a:ext cx="8520600" cy="780176"/>
+          </a:xfrm>
+          <a:prstGeom prst="rect">
+            <a:avLst/>
+          </a:prstGeom>
+        </p:spPr>
+        <p:txBody>
+          <a:bodyPr spcFirstLastPara="1" vert="horz" wrap="square" lIns="91425" tIns="91425" rIns="91425" bIns="91425" rtlCol="0" anchor="t" anchorCtr="0">
+            <a:noAutofit/>
+          </a:bodyPr>
+          <a:lstStyle>
+            <a:lvl1pPr marL="457200" lvl="0" indent="-342900" algn="l" defTabSz="685800" rtl="0" eaLnBrk="1" latinLnBrk="0" hangingPunct="1">
+              <a:lnSpc>
+                <a:spcPct val="90000"/>
+              </a:lnSpc>
+              <a:spcBef>
+                <a:spcPts val="0"/>
+              </a:spcBef>
+              <a:spcAft>
+                <a:spcPts val="0"/>
+              </a:spcAft>
+              <a:buClr>
+                <a:schemeClr val="accent1"/>
+              </a:buClr>
+              <a:buSzPts val="1800"/>
+              <a:buFont typeface="Calibri" panose="020F0502020204030204" pitchFamily="34" charset="0"/>
+              <a:buChar char="●"/>
+              <a:defRPr sz="1500" kern="1200">
+                <a:solidFill>
+                  <a:schemeClr val="tx1">
+                    <a:lumMod val="75000"/>
+                    <a:lumOff val="25000"/>
+                  </a:schemeClr>
+                </a:solidFill>
+                <a:latin typeface="+mn-lt"/>
+                <a:ea typeface="+mn-ea"/>
+                <a:cs typeface="+mn-cs"/>
+              </a:defRPr>
+            </a:lvl1pPr>
+            <a:lvl2pPr marL="914400" lvl="1" indent="-317500" algn="l" defTabSz="685800" rtl="0" eaLnBrk="1" latinLnBrk="0" hangingPunct="1">
+              <a:lnSpc>
+                <a:spcPct val="90000"/>
+              </a:lnSpc>
+              <a:spcBef>
+                <a:spcPts val="1600"/>
+              </a:spcBef>
+              <a:spcAft>
+                <a:spcPts val="0"/>
+              </a:spcAft>
+              <a:buClr>
+                <a:schemeClr val="accent1"/>
+              </a:buClr>
+              <a:buSzPts val="1400"/>
+              <a:buFont typeface="Calibri" pitchFamily="34" charset="0"/>
+              <a:buChar char="○"/>
+              <a:defRPr sz="1350" kern="1200">
+                <a:solidFill>
+                  <a:schemeClr val="tx1">
+                    <a:lumMod val="75000"/>
+                    <a:lumOff val="25000"/>
+                  </a:schemeClr>
+                </a:solidFill>
+                <a:latin typeface="+mn-lt"/>
+                <a:ea typeface="+mn-ea"/>
+                <a:cs typeface="+mn-cs"/>
+              </a:defRPr>
+            </a:lvl2pPr>
+            <a:lvl3pPr marL="1371600" lvl="2" indent="-317500" algn="l" defTabSz="685800" rtl="0" eaLnBrk="1" latinLnBrk="0" hangingPunct="1">
+              <a:lnSpc>
+                <a:spcPct val="90000"/>
+              </a:lnSpc>
+              <a:spcBef>
+                <a:spcPts val="1600"/>
+              </a:spcBef>
+              <a:spcAft>
+                <a:spcPts val="0"/>
+              </a:spcAft>
+              <a:buClr>
+                <a:schemeClr val="accent1"/>
+              </a:buClr>
+              <a:buSzPts val="1400"/>
+              <a:buFont typeface="Calibri" pitchFamily="34" charset="0"/>
+              <a:buChar char="■"/>
+              <a:defRPr sz="1050" kern="1200">
+                <a:solidFill>
+                  <a:schemeClr val="tx1">
+                    <a:lumMod val="75000"/>
+                    <a:lumOff val="25000"/>
+                  </a:schemeClr>
+                </a:solidFill>
+                <a:latin typeface="+mn-lt"/>
+                <a:ea typeface="+mn-ea"/>
+                <a:cs typeface="+mn-cs"/>
+              </a:defRPr>
+            </a:lvl3pPr>
+            <a:lvl4pPr marL="1828800" lvl="3" indent="-317500" algn="l" defTabSz="685800" rtl="0" eaLnBrk="1" latinLnBrk="0" hangingPunct="1">
+              <a:lnSpc>
+                <a:spcPct val="90000"/>
+              </a:lnSpc>
+              <a:spcBef>
+                <a:spcPts val="1600"/>
+              </a:spcBef>
+              <a:spcAft>
+                <a:spcPts val="0"/>
+              </a:spcAft>
+              <a:buClr>
+                <a:schemeClr val="accent1"/>
+              </a:buClr>
+              <a:buSzPts val="1400"/>
+              <a:buFont typeface="Calibri" pitchFamily="34" charset="0"/>
+              <a:buChar char="●"/>
+              <a:defRPr sz="1050" kern="1200">
+                <a:solidFill>
+                  <a:schemeClr val="tx1">
+                    <a:lumMod val="75000"/>
+                    <a:lumOff val="25000"/>
+                  </a:schemeClr>
+                </a:solidFill>
+                <a:latin typeface="+mn-lt"/>
+                <a:ea typeface="+mn-ea"/>
+                <a:cs typeface="+mn-cs"/>
+              </a:defRPr>
+            </a:lvl4pPr>
+            <a:lvl5pPr marL="2286000" lvl="4" indent="-317500" algn="l" defTabSz="685800" rtl="0" eaLnBrk="1" latinLnBrk="0" hangingPunct="1">
+              <a:lnSpc>
+                <a:spcPct val="90000"/>
+              </a:lnSpc>
+              <a:spcBef>
+                <a:spcPts val="1600"/>
+              </a:spcBef>
+              <a:spcAft>
+                <a:spcPts val="0"/>
+              </a:spcAft>
+              <a:buClr>
+                <a:schemeClr val="accent1"/>
+              </a:buClr>
+              <a:buSzPts val="1400"/>
+              <a:buFont typeface="Calibri" pitchFamily="34" charset="0"/>
+              <a:buChar char="○"/>
+              <a:defRPr sz="1050" kern="1200">
+                <a:solidFill>
+                  <a:schemeClr val="tx1">
+                    <a:lumMod val="75000"/>
+                    <a:lumOff val="25000"/>
+                  </a:schemeClr>
+                </a:solidFill>
+                <a:latin typeface="+mn-lt"/>
+                <a:ea typeface="+mn-ea"/>
+                <a:cs typeface="+mn-cs"/>
+              </a:defRPr>
+            </a:lvl5pPr>
+            <a:lvl6pPr marL="2743200" lvl="5" indent="-317500" algn="l" defTabSz="685800" rtl="0" eaLnBrk="1" latinLnBrk="0" hangingPunct="1">
+              <a:lnSpc>
+                <a:spcPct val="90000"/>
+              </a:lnSpc>
+              <a:spcBef>
+                <a:spcPts val="1600"/>
+              </a:spcBef>
+              <a:spcAft>
+                <a:spcPts val="0"/>
+              </a:spcAft>
+              <a:buClr>
+                <a:schemeClr val="accent1"/>
+              </a:buClr>
+              <a:buSzPts val="1400"/>
+              <a:buFont typeface="Calibri" pitchFamily="34" charset="0"/>
+              <a:buChar char="■"/>
+              <a:defRPr sz="1050" kern="1200">
+                <a:solidFill>
+                  <a:schemeClr val="tx1">
+                    <a:lumMod val="75000"/>
+                    <a:lumOff val="25000"/>
+                  </a:schemeClr>
+                </a:solidFill>
+                <a:latin typeface="+mn-lt"/>
+                <a:ea typeface="+mn-ea"/>
+                <a:cs typeface="+mn-cs"/>
+              </a:defRPr>
+            </a:lvl6pPr>
+            <a:lvl7pPr marL="3200400" lvl="6" indent="-317500" algn="l" defTabSz="685800" rtl="0" eaLnBrk="1" latinLnBrk="0" hangingPunct="1">
+              <a:lnSpc>
+                <a:spcPct val="90000"/>
+              </a:lnSpc>
+              <a:spcBef>
+                <a:spcPts val="1600"/>
+              </a:spcBef>
+              <a:spcAft>
+                <a:spcPts val="0"/>
+              </a:spcAft>
+              <a:buClr>
+                <a:schemeClr val="accent1"/>
+              </a:buClr>
+              <a:buSzPts val="1400"/>
+              <a:buFont typeface="Calibri" pitchFamily="34" charset="0"/>
+              <a:buChar char="●"/>
+              <a:defRPr sz="1050" kern="1200">
+                <a:solidFill>
+                  <a:schemeClr val="tx1">
+                    <a:lumMod val="75000"/>
+                    <a:lumOff val="25000"/>
+                  </a:schemeClr>
+                </a:solidFill>
+                <a:latin typeface="+mn-lt"/>
+                <a:ea typeface="+mn-ea"/>
+                <a:cs typeface="+mn-cs"/>
+              </a:defRPr>
+            </a:lvl7pPr>
+            <a:lvl8pPr marL="3657600" lvl="7" indent="-317500" algn="l" defTabSz="685800" rtl="0" eaLnBrk="1" latinLnBrk="0" hangingPunct="1">
+              <a:lnSpc>
+                <a:spcPct val="90000"/>
+              </a:lnSpc>
+              <a:spcBef>
+                <a:spcPts val="1600"/>
+              </a:spcBef>
+              <a:spcAft>
+                <a:spcPts val="0"/>
+              </a:spcAft>
+              <a:buClr>
+                <a:schemeClr val="accent1"/>
+              </a:buClr>
+              <a:buSzPts val="1400"/>
+              <a:buFont typeface="Calibri" pitchFamily="34" charset="0"/>
+              <a:buChar char="○"/>
+              <a:defRPr sz="1050" kern="1200">
+                <a:solidFill>
+                  <a:schemeClr val="tx1">
+                    <a:lumMod val="75000"/>
+                    <a:lumOff val="25000"/>
+                  </a:schemeClr>
+                </a:solidFill>
+                <a:latin typeface="+mn-lt"/>
+                <a:ea typeface="+mn-ea"/>
+                <a:cs typeface="+mn-cs"/>
+              </a:defRPr>
+            </a:lvl8pPr>
+            <a:lvl9pPr marL="4114800" lvl="8" indent="-317500" algn="l" defTabSz="685800" rtl="0" eaLnBrk="1" latinLnBrk="0" hangingPunct="1">
+              <a:lnSpc>
+                <a:spcPct val="90000"/>
+              </a:lnSpc>
+              <a:spcBef>
+                <a:spcPts val="1600"/>
+              </a:spcBef>
+              <a:spcAft>
+                <a:spcPts val="1600"/>
+              </a:spcAft>
+              <a:buClr>
+                <a:schemeClr val="accent1"/>
+              </a:buClr>
+              <a:buSzPts val="1400"/>
+              <a:buFont typeface="Calibri" pitchFamily="34" charset="0"/>
+              <a:buChar char="■"/>
+              <a:defRPr sz="1050" kern="1200">
+                <a:solidFill>
+                  <a:schemeClr val="tx1">
+                    <a:lumMod val="75000"/>
+                    <a:lumOff val="25000"/>
+                  </a:schemeClr>
+                </a:solidFill>
+                <a:latin typeface="+mn-lt"/>
+                <a:ea typeface="+mn-ea"/>
+                <a:cs typeface="+mn-cs"/>
+              </a:defRPr>
+            </a:lvl9pPr>
+          </a:lstStyle>
+          <a:p>
+            <a:pPr lvl="1"/>
+            <a:r>
+              <a:rPr lang="en-AU" dirty="0">
+                <a:solidFill>
+                  <a:schemeClr val="tx1"/>
+                </a:solidFill>
+              </a:rPr>
+              <a:t>Motivation </a:t>
+            </a:r>
           </a:p>
           <a:p>
             <a:pPr lvl="1"/>
@@ -14186,8 +16404,12 @@
               <a:buNone/>
             </a:pPr>
             <a:r>
-              <a:rPr lang="en-AU" dirty="0"/>
-              <a:t>Tasks</a:t>
+              <a:rPr lang="en-AU" dirty="0">
+                <a:solidFill>
+                  <a:schemeClr val="tx1"/>
+                </a:solidFill>
+              </a:rPr>
+              <a:t>Tasks: Finance API, News API, Questionnaire, UI, Integration</a:t>
             </a:r>
           </a:p>
         </p:txBody>
@@ -14478,8 +16700,53 @@
               <a:buNone/>
             </a:pPr>
             <a:r>
+              <a:rPr lang="en-US" dirty="0">
+                <a:solidFill>
+                  <a:schemeClr val="tx1"/>
+                </a:solidFill>
+              </a:rPr>
+              <a:t>Technologies used: </a:t>
+            </a:r>
+            <a:r>
+              <a:rPr lang="en-US" dirty="0" err="1">
+                <a:solidFill>
+                  <a:schemeClr val="tx1"/>
+                </a:solidFill>
+              </a:rPr>
+              <a:t>Gitkraken</a:t>
+            </a:r>
+            <a:r>
+              <a:rPr lang="en-US" dirty="0">
+                <a:solidFill>
+                  <a:schemeClr val="tx1"/>
+                </a:solidFill>
+              </a:rPr>
+              <a:t>, </a:t>
+            </a:r>
+            <a:r>
+              <a:rPr lang="en-US" dirty="0" err="1">
+                <a:solidFill>
+                  <a:schemeClr val="tx1"/>
+                </a:solidFill>
+              </a:rPr>
+              <a:t>Github</a:t>
+            </a:r>
+            <a:r>
+              <a:rPr lang="en-US" dirty="0">
+                <a:solidFill>
+                  <a:schemeClr val="tx1"/>
+                </a:solidFill>
+              </a:rPr>
+              <a:t>, VS Code, Yahoo Finance API, News API</a:t>
+            </a:r>
+          </a:p>
+          <a:p>
+            <a:pPr marL="114300" indent="0">
+              <a:buNone/>
+            </a:pPr>
+            <a:r>
               <a:rPr lang="en-US" dirty="0"/>
-              <a:t>Technologies used				</a:t>
+              <a:t>				</a:t>
             </a:r>
           </a:p>
           <a:p>
@@ -14777,8 +17044,12 @@
               <a:buNone/>
             </a:pPr>
             <a:r>
-              <a:rPr lang="en-US" dirty="0"/>
-              <a:t>Challenges</a:t>
+              <a:rPr lang="en-US" dirty="0">
+                <a:solidFill>
+                  <a:schemeClr val="tx1"/>
+                </a:solidFill>
+              </a:rPr>
+              <a:t>Challenges: Finding appropriate API,  API call limits (calls/month &amp; calls/second)</a:t>
             </a:r>
           </a:p>
         </p:txBody>
@@ -15069,8 +17340,28 @@
               <a:buNone/>
             </a:pPr>
             <a:r>
-              <a:rPr lang="en-US" dirty="0"/>
-              <a:t>Successes</a:t>
+              <a:rPr lang="en-US" dirty="0">
+                <a:solidFill>
+                  <a:schemeClr val="tx1"/>
+                </a:solidFill>
+              </a:rPr>
+              <a:t>Success’:  Happy with result,  </a:t>
+            </a:r>
+            <a:r>
+              <a:rPr lang="en-US" dirty="0" err="1">
+                <a:solidFill>
+                  <a:schemeClr val="tx1"/>
+                </a:solidFill>
+              </a:rPr>
+              <a:t>Github</a:t>
+            </a:r>
+            <a:r>
+              <a:rPr lang="en-US" dirty="0">
+                <a:solidFill>
+                  <a:schemeClr val="tx1"/>
+                </a:solidFill>
+              </a:rPr>
+              <a:t> team functions,  Team Work!</a:t>
             </a:r>
           </a:p>
         </p:txBody>
@@ -15760,7 +18051,7 @@
           <p:nvPr>
             <p:extLst>
               <p:ext uri="{D42A27DB-BD31-4B8C-83A1-F6EECF244321}">
-                <p14:modId xmlns:p14="http://schemas.microsoft.com/office/powerpoint/2010/main" val="924491500"/>
+                <p14:modId xmlns:p14="http://schemas.microsoft.com/office/powerpoint/2010/main" val="1903116678"/>
               </p:ext>
             </p:extLst>
           </p:nvPr>

</xml_diff>